<commit_message>
Update 003 Funtional Programming.pptx
</commit_message>
<xml_diff>
--- a/GFG JS Course Curriculam/Articles/003 Funtional Programming.pptx
+++ b/GFG JS Course Curriculam/Articles/003 Funtional Programming.pptx
@@ -2,52 +2,52 @@
 <file path=ppt/presentation.xml><?xml version="1.0" encoding="utf-8"?>
 <p:presentation xmlns:a="http://schemas.openxmlformats.org/drawingml/2006/main" xmlns:r="http://schemas.openxmlformats.org/officeDocument/2006/relationships" xmlns:p="http://schemas.openxmlformats.org/presentationml/2006/main" saveSubsetFonts="1">
   <p:sldMasterIdLst>
-    <p:sldMasterId id="2147483810" r:id="rId1"/>
+    <p:sldMasterId id="2147483810" r:id="rId3"/>
   </p:sldMasterIdLst>
   <p:sldIdLst>
-    <p:sldId id="256" r:id="rId2"/>
-    <p:sldId id="257" r:id="rId3"/>
-    <p:sldId id="258" r:id="rId4"/>
-    <p:sldId id="259" r:id="rId5"/>
-    <p:sldId id="260" r:id="rId6"/>
-    <p:sldId id="261" r:id="rId7"/>
-    <p:sldId id="262" r:id="rId8"/>
-    <p:sldId id="263" r:id="rId9"/>
-    <p:sldId id="264" r:id="rId10"/>
-    <p:sldId id="265" r:id="rId11"/>
-    <p:sldId id="266" r:id="rId12"/>
-    <p:sldId id="267" r:id="rId13"/>
-    <p:sldId id="268" r:id="rId14"/>
-    <p:sldId id="269" r:id="rId15"/>
-    <p:sldId id="270" r:id="rId16"/>
-    <p:sldId id="271" r:id="rId17"/>
-    <p:sldId id="272" r:id="rId18"/>
-    <p:sldId id="273" r:id="rId19"/>
-    <p:sldId id="274" r:id="rId20"/>
-    <p:sldId id="275" r:id="rId21"/>
-    <p:sldId id="276" r:id="rId22"/>
-    <p:sldId id="277" r:id="rId23"/>
-    <p:sldId id="278" r:id="rId24"/>
-    <p:sldId id="279" r:id="rId25"/>
-    <p:sldId id="280" r:id="rId26"/>
-    <p:sldId id="281" r:id="rId27"/>
-    <p:sldId id="282" r:id="rId28"/>
-    <p:sldId id="283" r:id="rId29"/>
-    <p:sldId id="284" r:id="rId30"/>
-    <p:sldId id="285" r:id="rId31"/>
-    <p:sldId id="286" r:id="rId32"/>
-    <p:sldId id="287" r:id="rId33"/>
-    <p:sldId id="288" r:id="rId34"/>
-    <p:sldId id="289" r:id="rId35"/>
-    <p:sldId id="290" r:id="rId36"/>
-    <p:sldId id="291" r:id="rId37"/>
-    <p:sldId id="292" r:id="rId38"/>
-    <p:sldId id="293" r:id="rId39"/>
-    <p:sldId id="294" r:id="rId40"/>
-    <p:sldId id="295" r:id="rId41"/>
-    <p:sldId id="296" r:id="rId42"/>
-    <p:sldId id="297" r:id="rId43"/>
-    <p:sldId id="298" r:id="rId44"/>
+    <p:sldId id="256" r:id="rId4"/>
+    <p:sldId id="257" r:id="rId5"/>
+    <p:sldId id="258" r:id="rId6"/>
+    <p:sldId id="259" r:id="rId7"/>
+    <p:sldId id="260" r:id="rId8"/>
+    <p:sldId id="261" r:id="rId9"/>
+    <p:sldId id="262" r:id="rId10"/>
+    <p:sldId id="263" r:id="rId11"/>
+    <p:sldId id="264" r:id="rId12"/>
+    <p:sldId id="265" r:id="rId13"/>
+    <p:sldId id="266" r:id="rId14"/>
+    <p:sldId id="267" r:id="rId15"/>
+    <p:sldId id="268" r:id="rId16"/>
+    <p:sldId id="269" r:id="rId17"/>
+    <p:sldId id="270" r:id="rId18"/>
+    <p:sldId id="271" r:id="rId19"/>
+    <p:sldId id="272" r:id="rId20"/>
+    <p:sldId id="273" r:id="rId21"/>
+    <p:sldId id="274" r:id="rId22"/>
+    <p:sldId id="275" r:id="rId23"/>
+    <p:sldId id="276" r:id="rId24"/>
+    <p:sldId id="277" r:id="rId25"/>
+    <p:sldId id="278" r:id="rId26"/>
+    <p:sldId id="279" r:id="rId27"/>
+    <p:sldId id="280" r:id="rId28"/>
+    <p:sldId id="281" r:id="rId29"/>
+    <p:sldId id="282" r:id="rId30"/>
+    <p:sldId id="283" r:id="rId31"/>
+    <p:sldId id="284" r:id="rId32"/>
+    <p:sldId id="285" r:id="rId33"/>
+    <p:sldId id="286" r:id="rId34"/>
+    <p:sldId id="287" r:id="rId35"/>
+    <p:sldId id="288" r:id="rId36"/>
+    <p:sldId id="289" r:id="rId37"/>
+    <p:sldId id="290" r:id="rId38"/>
+    <p:sldId id="291" r:id="rId39"/>
+    <p:sldId id="292" r:id="rId40"/>
+    <p:sldId id="293" r:id="rId41"/>
+    <p:sldId id="294" r:id="rId42"/>
+    <p:sldId id="295" r:id="rId43"/>
+    <p:sldId id="296" r:id="rId44"/>
+    <p:sldId id="297" r:id="rId45"/>
+    <p:sldId id="298" r:id="rId46"/>
   </p:sldIdLst>
   <p:sldSz cx="12192000" cy="6858000"/>
   <p:notesSz cx="6858000" cy="9144000"/>
@@ -146,7 +146,226 @@
       </a:defRPr>
     </a:lvl9pPr>
   </p:defaultTextStyle>
+  <p:extLst>
+    <p:ext uri="{EFAFB233-063F-42B5-8137-9DF3F51BA10A}">
+      <p15:sldGuideLst xmlns:p15="http://schemas.microsoft.com/office/powerpoint/2012/main"/>
+    </p:ext>
+  </p:extLst>
 </p:presentation>
+</file>
+
+<file path=ppt/revisionInfo.xml><?xml version="1.0" encoding="utf-8"?>
+<p1510:revInfo xmlns:a="http://schemas.openxmlformats.org/drawingml/2006/main" xmlns:r="http://schemas.openxmlformats.org/officeDocument/2006/relationships" xmlns:p1510="http://schemas.microsoft.com/office/powerpoint/2015/10/main">
+  <p1510:revLst>
+    <p1510:client id="{B3A1381A-B3CF-4F20-8CA0-3D6AEC5B44B2}" v="2" dt="2022-12-12T05:32:35.587"/>
+  </p1510:revLst>
+</p1510:revInfo>
+</file>
+
+<file path=ppt/changesInfos/changesInfo1.xml><?xml version="1.0" encoding="utf-8"?>
+<pc:chgInfo xmlns:a="http://schemas.openxmlformats.org/drawingml/2006/main" xmlns:r="http://schemas.openxmlformats.org/officeDocument/2006/relationships" xmlns:ac="http://schemas.microsoft.com/office/drawing/2013/main/command" xmlns:pc="http://schemas.microsoft.com/office/powerpoint/2013/main/command">
+  <pc:docChgLst>
+    <pc:chgData name="Jana, Pramod" userId="9d7ae763-7cdf-4ef2-bc00-3679debba132" providerId="ADAL" clId="{B3A1381A-B3CF-4F20-8CA0-3D6AEC5B44B2}"/>
+    <pc:docChg chg="undo custSel modSld">
+      <pc:chgData name="Jana, Pramod" userId="9d7ae763-7cdf-4ef2-bc00-3679debba132" providerId="ADAL" clId="{B3A1381A-B3CF-4F20-8CA0-3D6AEC5B44B2}" dt="2022-12-12T07:34:18.800" v="337" actId="14100"/>
+      <pc:docMkLst>
+        <pc:docMk/>
+      </pc:docMkLst>
+      <pc:sldChg chg="modSp mod">
+        <pc:chgData name="Jana, Pramod" userId="9d7ae763-7cdf-4ef2-bc00-3679debba132" providerId="ADAL" clId="{B3A1381A-B3CF-4F20-8CA0-3D6AEC5B44B2}" dt="2022-12-12T05:28:48.621" v="41" actId="27636"/>
+        <pc:sldMkLst>
+          <pc:docMk/>
+          <pc:sldMk cId="1426568478" sldId="264"/>
+        </pc:sldMkLst>
+        <pc:spChg chg="mod">
+          <ac:chgData name="Jana, Pramod" userId="9d7ae763-7cdf-4ef2-bc00-3679debba132" providerId="ADAL" clId="{B3A1381A-B3CF-4F20-8CA0-3D6AEC5B44B2}" dt="2022-12-12T05:27:05.321" v="12" actId="27636"/>
+          <ac:spMkLst>
+            <pc:docMk/>
+            <pc:sldMk cId="1426568478" sldId="264"/>
+            <ac:spMk id="2" creationId="{31B1D637-3BFE-803A-64A3-94547CE09AE5}"/>
+          </ac:spMkLst>
+        </pc:spChg>
+        <pc:spChg chg="mod">
+          <ac:chgData name="Jana, Pramod" userId="9d7ae763-7cdf-4ef2-bc00-3679debba132" providerId="ADAL" clId="{B3A1381A-B3CF-4F20-8CA0-3D6AEC5B44B2}" dt="2022-12-12T05:28:48.621" v="41" actId="27636"/>
+          <ac:spMkLst>
+            <pc:docMk/>
+            <pc:sldMk cId="1426568478" sldId="264"/>
+            <ac:spMk id="3" creationId="{7A574EAA-0EDC-C9CA-9D88-302421F336EE}"/>
+          </ac:spMkLst>
+        </pc:spChg>
+      </pc:sldChg>
+      <pc:sldChg chg="modSp mod">
+        <pc:chgData name="Jana, Pramod" userId="9d7ae763-7cdf-4ef2-bc00-3679debba132" providerId="ADAL" clId="{B3A1381A-B3CF-4F20-8CA0-3D6AEC5B44B2}" dt="2022-12-12T05:31:31.496" v="77" actId="27636"/>
+        <pc:sldMkLst>
+          <pc:docMk/>
+          <pc:sldMk cId="3893151268" sldId="265"/>
+        </pc:sldMkLst>
+        <pc:spChg chg="mod">
+          <ac:chgData name="Jana, Pramod" userId="9d7ae763-7cdf-4ef2-bc00-3679debba132" providerId="ADAL" clId="{B3A1381A-B3CF-4F20-8CA0-3D6AEC5B44B2}" dt="2022-12-12T05:29:17.840" v="45" actId="14100"/>
+          <ac:spMkLst>
+            <pc:docMk/>
+            <pc:sldMk cId="3893151268" sldId="265"/>
+            <ac:spMk id="2" creationId="{4A207264-025E-E3C7-C495-7FBBD7717E74}"/>
+          </ac:spMkLst>
+        </pc:spChg>
+        <pc:spChg chg="mod">
+          <ac:chgData name="Jana, Pramod" userId="9d7ae763-7cdf-4ef2-bc00-3679debba132" providerId="ADAL" clId="{B3A1381A-B3CF-4F20-8CA0-3D6AEC5B44B2}" dt="2022-12-12T05:31:31.496" v="77" actId="27636"/>
+          <ac:spMkLst>
+            <pc:docMk/>
+            <pc:sldMk cId="3893151268" sldId="265"/>
+            <ac:spMk id="3" creationId="{D1C186B1-78C2-C9AA-C757-B5048577BAFE}"/>
+          </ac:spMkLst>
+        </pc:spChg>
+      </pc:sldChg>
+      <pc:sldChg chg="addSp delSp modSp mod setBg">
+        <pc:chgData name="Jana, Pramod" userId="9d7ae763-7cdf-4ef2-bc00-3679debba132" providerId="ADAL" clId="{B3A1381A-B3CF-4F20-8CA0-3D6AEC5B44B2}" dt="2022-12-12T05:34:57.705" v="125" actId="27636"/>
+        <pc:sldMkLst>
+          <pc:docMk/>
+          <pc:sldMk cId="315933119" sldId="266"/>
+        </pc:sldMkLst>
+        <pc:spChg chg="mod">
+          <ac:chgData name="Jana, Pramod" userId="9d7ae763-7cdf-4ef2-bc00-3679debba132" providerId="ADAL" clId="{B3A1381A-B3CF-4F20-8CA0-3D6AEC5B44B2}" dt="2022-12-12T05:34:57.705" v="125" actId="27636"/>
+          <ac:spMkLst>
+            <pc:docMk/>
+            <pc:sldMk cId="315933119" sldId="266"/>
+            <ac:spMk id="2" creationId="{193AB13F-5F7F-F81C-598D-52EC02F0B343}"/>
+          </ac:spMkLst>
+        </pc:spChg>
+        <pc:spChg chg="mod">
+          <ac:chgData name="Jana, Pramod" userId="9d7ae763-7cdf-4ef2-bc00-3679debba132" providerId="ADAL" clId="{B3A1381A-B3CF-4F20-8CA0-3D6AEC5B44B2}" dt="2022-12-12T05:34:18.582" v="121" actId="27636"/>
+          <ac:spMkLst>
+            <pc:docMk/>
+            <pc:sldMk cId="315933119" sldId="266"/>
+            <ac:spMk id="3" creationId="{44192E32-EAED-24DB-EC74-D2364B2CBACC}"/>
+          </ac:spMkLst>
+        </pc:spChg>
+        <pc:spChg chg="add del">
+          <ac:chgData name="Jana, Pramod" userId="9d7ae763-7cdf-4ef2-bc00-3679debba132" providerId="ADAL" clId="{B3A1381A-B3CF-4F20-8CA0-3D6AEC5B44B2}" dt="2022-12-12T05:32:35.587" v="84"/>
+          <ac:spMkLst>
+            <pc:docMk/>
+            <pc:sldMk cId="315933119" sldId="266"/>
+            <ac:spMk id="4" creationId="{8BFFB33B-BFAF-4432-9E7D-BDC5E9B298E5}"/>
+          </ac:spMkLst>
+        </pc:spChg>
+      </pc:sldChg>
+      <pc:sldChg chg="modSp mod">
+        <pc:chgData name="Jana, Pramod" userId="9d7ae763-7cdf-4ef2-bc00-3679debba132" providerId="ADAL" clId="{B3A1381A-B3CF-4F20-8CA0-3D6AEC5B44B2}" dt="2022-12-12T05:36:05.480" v="145" actId="27636"/>
+        <pc:sldMkLst>
+          <pc:docMk/>
+          <pc:sldMk cId="4049704700" sldId="267"/>
+        </pc:sldMkLst>
+        <pc:spChg chg="mod">
+          <ac:chgData name="Jana, Pramod" userId="9d7ae763-7cdf-4ef2-bc00-3679debba132" providerId="ADAL" clId="{B3A1381A-B3CF-4F20-8CA0-3D6AEC5B44B2}" dt="2022-12-12T05:35:06.540" v="128" actId="27636"/>
+          <ac:spMkLst>
+            <pc:docMk/>
+            <pc:sldMk cId="4049704700" sldId="267"/>
+            <ac:spMk id="2" creationId="{DFF911A5-FC68-8EFD-6F7D-E820B88AADAF}"/>
+          </ac:spMkLst>
+        </pc:spChg>
+        <pc:spChg chg="mod">
+          <ac:chgData name="Jana, Pramod" userId="9d7ae763-7cdf-4ef2-bc00-3679debba132" providerId="ADAL" clId="{B3A1381A-B3CF-4F20-8CA0-3D6AEC5B44B2}" dt="2022-12-12T05:36:05.480" v="145" actId="27636"/>
+          <ac:spMkLst>
+            <pc:docMk/>
+            <pc:sldMk cId="4049704700" sldId="267"/>
+            <ac:spMk id="3" creationId="{FF2AAA2A-4627-78B7-7CA3-93D5DDD6A549}"/>
+          </ac:spMkLst>
+        </pc:spChg>
+      </pc:sldChg>
+      <pc:sldChg chg="modSp mod">
+        <pc:chgData name="Jana, Pramod" userId="9d7ae763-7cdf-4ef2-bc00-3679debba132" providerId="ADAL" clId="{B3A1381A-B3CF-4F20-8CA0-3D6AEC5B44B2}" dt="2022-12-12T06:28:34.766" v="208" actId="27636"/>
+        <pc:sldMkLst>
+          <pc:docMk/>
+          <pc:sldMk cId="650013579" sldId="268"/>
+        </pc:sldMkLst>
+        <pc:spChg chg="mod">
+          <ac:chgData name="Jana, Pramod" userId="9d7ae763-7cdf-4ef2-bc00-3679debba132" providerId="ADAL" clId="{B3A1381A-B3CF-4F20-8CA0-3D6AEC5B44B2}" dt="2022-12-12T06:25:30.760" v="148" actId="14100"/>
+          <ac:spMkLst>
+            <pc:docMk/>
+            <pc:sldMk cId="650013579" sldId="268"/>
+            <ac:spMk id="2" creationId="{F87F143A-5B74-D1D9-9C40-B4F75C4710C9}"/>
+          </ac:spMkLst>
+        </pc:spChg>
+        <pc:spChg chg="mod">
+          <ac:chgData name="Jana, Pramod" userId="9d7ae763-7cdf-4ef2-bc00-3679debba132" providerId="ADAL" clId="{B3A1381A-B3CF-4F20-8CA0-3D6AEC5B44B2}" dt="2022-12-12T06:28:34.766" v="208" actId="27636"/>
+          <ac:spMkLst>
+            <pc:docMk/>
+            <pc:sldMk cId="650013579" sldId="268"/>
+            <ac:spMk id="3" creationId="{05CA4047-604A-1B53-91CB-FC628F6EAA6F}"/>
+          </ac:spMkLst>
+        </pc:spChg>
+      </pc:sldChg>
+      <pc:sldChg chg="modSp mod">
+        <pc:chgData name="Jana, Pramod" userId="9d7ae763-7cdf-4ef2-bc00-3679debba132" providerId="ADAL" clId="{B3A1381A-B3CF-4F20-8CA0-3D6AEC5B44B2}" dt="2022-12-12T06:34:35.212" v="256" actId="15"/>
+        <pc:sldMkLst>
+          <pc:docMk/>
+          <pc:sldMk cId="3490892966" sldId="269"/>
+        </pc:sldMkLst>
+        <pc:spChg chg="mod">
+          <ac:chgData name="Jana, Pramod" userId="9d7ae763-7cdf-4ef2-bc00-3679debba132" providerId="ADAL" clId="{B3A1381A-B3CF-4F20-8CA0-3D6AEC5B44B2}" dt="2022-12-12T06:31:35.554" v="214" actId="27636"/>
+          <ac:spMkLst>
+            <pc:docMk/>
+            <pc:sldMk cId="3490892966" sldId="269"/>
+            <ac:spMk id="2" creationId="{F36E67A1-2061-E03D-4719-7A31EE409B53}"/>
+          </ac:spMkLst>
+        </pc:spChg>
+        <pc:spChg chg="mod">
+          <ac:chgData name="Jana, Pramod" userId="9d7ae763-7cdf-4ef2-bc00-3679debba132" providerId="ADAL" clId="{B3A1381A-B3CF-4F20-8CA0-3D6AEC5B44B2}" dt="2022-12-12T06:34:35.212" v="256" actId="15"/>
+          <ac:spMkLst>
+            <pc:docMk/>
+            <pc:sldMk cId="3490892966" sldId="269"/>
+            <ac:spMk id="3" creationId="{E15FCD1E-4587-9E85-FBD2-DC27A89314B5}"/>
+          </ac:spMkLst>
+        </pc:spChg>
+      </pc:sldChg>
+      <pc:sldChg chg="modSp mod">
+        <pc:chgData name="Jana, Pramod" userId="9d7ae763-7cdf-4ef2-bc00-3679debba132" providerId="ADAL" clId="{B3A1381A-B3CF-4F20-8CA0-3D6AEC5B44B2}" dt="2022-12-12T07:32:11.135" v="298" actId="27636"/>
+        <pc:sldMkLst>
+          <pc:docMk/>
+          <pc:sldMk cId="972233614" sldId="270"/>
+        </pc:sldMkLst>
+        <pc:spChg chg="mod">
+          <ac:chgData name="Jana, Pramod" userId="9d7ae763-7cdf-4ef2-bc00-3679debba132" providerId="ADAL" clId="{B3A1381A-B3CF-4F20-8CA0-3D6AEC5B44B2}" dt="2022-12-12T07:28:54.601" v="261" actId="14100"/>
+          <ac:spMkLst>
+            <pc:docMk/>
+            <pc:sldMk cId="972233614" sldId="270"/>
+            <ac:spMk id="2" creationId="{D7065325-CA2E-A701-7B9A-27E5138B9D9D}"/>
+          </ac:spMkLst>
+        </pc:spChg>
+        <pc:spChg chg="mod">
+          <ac:chgData name="Jana, Pramod" userId="9d7ae763-7cdf-4ef2-bc00-3679debba132" providerId="ADAL" clId="{B3A1381A-B3CF-4F20-8CA0-3D6AEC5B44B2}" dt="2022-12-12T07:32:11.135" v="298" actId="27636"/>
+          <ac:spMkLst>
+            <pc:docMk/>
+            <pc:sldMk cId="972233614" sldId="270"/>
+            <ac:spMk id="3" creationId="{EC102868-037B-577E-D4A8-215C81BF8723}"/>
+          </ac:spMkLst>
+        </pc:spChg>
+      </pc:sldChg>
+      <pc:sldChg chg="modSp mod">
+        <pc:chgData name="Jana, Pramod" userId="9d7ae763-7cdf-4ef2-bc00-3679debba132" providerId="ADAL" clId="{B3A1381A-B3CF-4F20-8CA0-3D6AEC5B44B2}" dt="2022-12-12T07:34:18.800" v="337" actId="14100"/>
+        <pc:sldMkLst>
+          <pc:docMk/>
+          <pc:sldMk cId="1156729451" sldId="271"/>
+        </pc:sldMkLst>
+        <pc:spChg chg="mod">
+          <ac:chgData name="Jana, Pramod" userId="9d7ae763-7cdf-4ef2-bc00-3679debba132" providerId="ADAL" clId="{B3A1381A-B3CF-4F20-8CA0-3D6AEC5B44B2}" dt="2022-12-12T07:33:42.592" v="305" actId="14100"/>
+          <ac:spMkLst>
+            <pc:docMk/>
+            <pc:sldMk cId="1156729451" sldId="271"/>
+            <ac:spMk id="2" creationId="{E07BCFEB-D754-39DF-6829-AC557FF956D3}"/>
+          </ac:spMkLst>
+        </pc:spChg>
+        <pc:spChg chg="mod">
+          <ac:chgData name="Jana, Pramod" userId="9d7ae763-7cdf-4ef2-bc00-3679debba132" providerId="ADAL" clId="{B3A1381A-B3CF-4F20-8CA0-3D6AEC5B44B2}" dt="2022-12-12T07:34:18.800" v="337" actId="14100"/>
+          <ac:spMkLst>
+            <pc:docMk/>
+            <pc:sldMk cId="1156729451" sldId="271"/>
+            <ac:spMk id="3" creationId="{7B9F39F9-B98E-1747-DCB0-C2BB4783BC8F}"/>
+          </ac:spMkLst>
+        </pc:spChg>
+      </pc:sldChg>
+    </pc:docChg>
+  </pc:docChgLst>
+</pc:chgInfo>
 </file>
 
 <file path=ppt/slideLayouts/slideLayout1.xml><?xml version="1.0" encoding="utf-8"?>
@@ -199,7 +418,7 @@
           <a:noFill/>
           <a:extLst>
             <a:ext uri="{909E8E84-426E-40dd-AFC4-6F175D3DCCD1}">
-              <a14:hiddenFill xmlns:a14="http://schemas.microsoft.com/office/drawing/2010/main" xmlns="">
+              <a14:hiddenFill xmlns="" xmlns:a14="http://schemas.microsoft.com/office/drawing/2010/main">
                 <a:solidFill>
                   <a:srgbClr val="FFFFFF"/>
                 </a:solidFill>
@@ -259,7 +478,7 @@
             </a:ln>
             <a:extLst>
               <a:ext uri="{91240B29-F687-4f45-9708-019B960494DF}">
-                <a14:hiddenLine xmlns:a14="http://schemas.microsoft.com/office/drawing/2010/main" xmlns="" w="9525">
+                <a14:hiddenLine xmlns="" xmlns:a14="http://schemas.microsoft.com/office/drawing/2010/main" w="9525">
                   <a:solidFill>
                     <a:srgbClr val="000000"/>
                   </a:solidFill>
@@ -349,7 +568,7 @@
             </a:ln>
             <a:extLst>
               <a:ext uri="{91240B29-F687-4f45-9708-019B960494DF}">
-                <a14:hiddenLine xmlns:a14="http://schemas.microsoft.com/office/drawing/2010/main" xmlns="" w="9525">
+                <a14:hiddenLine xmlns="" xmlns:a14="http://schemas.microsoft.com/office/drawing/2010/main" w="9525">
                   <a:solidFill>
                     <a:srgbClr val="000000"/>
                   </a:solidFill>
@@ -439,7 +658,7 @@
             </a:ln>
             <a:extLst>
               <a:ext uri="{91240B29-F687-4f45-9708-019B960494DF}">
-                <a14:hiddenLine xmlns:a14="http://schemas.microsoft.com/office/drawing/2010/main" xmlns="" w="9525">
+                <a14:hiddenLine xmlns="" xmlns:a14="http://schemas.microsoft.com/office/drawing/2010/main" w="9525">
                   <a:solidFill>
                     <a:srgbClr val="000000"/>
                   </a:solidFill>
@@ -473,7 +692,7 @@
             </a:ln>
             <a:extLst>
               <a:ext uri="{91240B29-F687-4f45-9708-019B960494DF}">
-                <a14:hiddenLine xmlns:a14="http://schemas.microsoft.com/office/drawing/2010/main" xmlns="" w="9525">
+                <a14:hiddenLine xmlns="" xmlns:a14="http://schemas.microsoft.com/office/drawing/2010/main" w="9525">
                   <a:solidFill>
                     <a:srgbClr val="000000"/>
                   </a:solidFill>
@@ -563,7 +782,7 @@
             </a:ln>
             <a:extLst>
               <a:ext uri="{91240B29-F687-4f45-9708-019B960494DF}">
-                <a14:hiddenLine xmlns:a14="http://schemas.microsoft.com/office/drawing/2010/main" xmlns="" w="9525">
+                <a14:hiddenLine xmlns="" xmlns:a14="http://schemas.microsoft.com/office/drawing/2010/main" w="9525">
                   <a:solidFill>
                     <a:srgbClr val="000000"/>
                   </a:solidFill>
@@ -625,7 +844,7 @@
             </a:ln>
             <a:extLst>
               <a:ext uri="{91240B29-F687-4f45-9708-019B960494DF}">
-                <a14:hiddenLine xmlns:a14="http://schemas.microsoft.com/office/drawing/2010/main" xmlns="" w="9525">
+                <a14:hiddenLine xmlns="" xmlns:a14="http://schemas.microsoft.com/office/drawing/2010/main" w="9525">
                   <a:solidFill>
                     <a:srgbClr val="000000"/>
                   </a:solidFill>
@@ -687,7 +906,7 @@
             </a:ln>
             <a:extLst>
               <a:ext uri="{91240B29-F687-4f45-9708-019B960494DF}">
-                <a14:hiddenLine xmlns:a14="http://schemas.microsoft.com/office/drawing/2010/main" xmlns="" w="9525">
+                <a14:hiddenLine xmlns="" xmlns:a14="http://schemas.microsoft.com/office/drawing/2010/main" w="9525">
                   <a:solidFill>
                     <a:srgbClr val="000000"/>
                   </a:solidFill>
@@ -777,7 +996,7 @@
             </a:ln>
             <a:extLst>
               <a:ext uri="{91240B29-F687-4f45-9708-019B960494DF}">
-                <a14:hiddenLine xmlns:a14="http://schemas.microsoft.com/office/drawing/2010/main" xmlns="" w="9525">
+                <a14:hiddenLine xmlns="" xmlns:a14="http://schemas.microsoft.com/office/drawing/2010/main" w="9525">
                   <a:solidFill>
                     <a:srgbClr val="000000"/>
                   </a:solidFill>
@@ -839,7 +1058,7 @@
             </a:ln>
             <a:extLst>
               <a:ext uri="{91240B29-F687-4f45-9708-019B960494DF}">
-                <a14:hiddenLine xmlns:a14="http://schemas.microsoft.com/office/drawing/2010/main" xmlns="" w="9525">
+                <a14:hiddenLine xmlns="" xmlns:a14="http://schemas.microsoft.com/office/drawing/2010/main" w="9525">
                   <a:solidFill>
                     <a:srgbClr val="000000"/>
                   </a:solidFill>
@@ -901,7 +1120,7 @@
             </a:ln>
             <a:extLst>
               <a:ext uri="{91240B29-F687-4f45-9708-019B960494DF}">
-                <a14:hiddenLine xmlns:a14="http://schemas.microsoft.com/office/drawing/2010/main" xmlns="" w="9525">
+                <a14:hiddenLine xmlns="" xmlns:a14="http://schemas.microsoft.com/office/drawing/2010/main" w="9525">
                   <a:solidFill>
                     <a:srgbClr val="000000"/>
                   </a:solidFill>
@@ -991,7 +1210,7 @@
             </a:ln>
             <a:extLst>
               <a:ext uri="{91240B29-F687-4f45-9708-019B960494DF}">
-                <a14:hiddenLine xmlns:a14="http://schemas.microsoft.com/office/drawing/2010/main" xmlns="" w="9525">
+                <a14:hiddenLine xmlns="" xmlns:a14="http://schemas.microsoft.com/office/drawing/2010/main" w="9525">
                   <a:solidFill>
                     <a:srgbClr val="000000"/>
                   </a:solidFill>
@@ -1081,7 +1300,7 @@
             </a:ln>
             <a:extLst>
               <a:ext uri="{91240B29-F687-4f45-9708-019B960494DF}">
-                <a14:hiddenLine xmlns:a14="http://schemas.microsoft.com/office/drawing/2010/main" xmlns="" w="9525">
+                <a14:hiddenLine xmlns="" xmlns:a14="http://schemas.microsoft.com/office/drawing/2010/main" w="9525">
                   <a:solidFill>
                     <a:srgbClr val="000000"/>
                   </a:solidFill>
@@ -1143,7 +1362,7 @@
             </a:ln>
             <a:extLst>
               <a:ext uri="{91240B29-F687-4f45-9708-019B960494DF}">
-                <a14:hiddenLine xmlns:a14="http://schemas.microsoft.com/office/drawing/2010/main" xmlns="" w="9525">
+                <a14:hiddenLine xmlns="" xmlns:a14="http://schemas.microsoft.com/office/drawing/2010/main" w="9525">
                   <a:solidFill>
                     <a:srgbClr val="000000"/>
                   </a:solidFill>
@@ -1253,7 +1472,7 @@
             </a:ln>
             <a:extLst>
               <a:ext uri="{91240B29-F687-4f45-9708-019B960494DF}">
-                <a14:hiddenLine xmlns:a14="http://schemas.microsoft.com/office/drawing/2010/main" xmlns="" w="9525">
+                <a14:hiddenLine xmlns="" xmlns:a14="http://schemas.microsoft.com/office/drawing/2010/main" w="9525">
                   <a:solidFill>
                     <a:srgbClr val="000000"/>
                   </a:solidFill>
@@ -1315,7 +1534,7 @@
             </a:ln>
             <a:extLst>
               <a:ext uri="{91240B29-F687-4f45-9708-019B960494DF}">
-                <a14:hiddenLine xmlns:a14="http://schemas.microsoft.com/office/drawing/2010/main" xmlns="" w="9525">
+                <a14:hiddenLine xmlns="" xmlns:a14="http://schemas.microsoft.com/office/drawing/2010/main" w="9525">
                   <a:solidFill>
                     <a:srgbClr val="000000"/>
                   </a:solidFill>
@@ -1405,7 +1624,7 @@
             </a:ln>
             <a:extLst>
               <a:ext uri="{91240B29-F687-4f45-9708-019B960494DF}">
-                <a14:hiddenLine xmlns:a14="http://schemas.microsoft.com/office/drawing/2010/main" xmlns="" w="9525">
+                <a14:hiddenLine xmlns="" xmlns:a14="http://schemas.microsoft.com/office/drawing/2010/main" w="9525">
                   <a:solidFill>
                     <a:srgbClr val="000000"/>
                   </a:solidFill>
@@ -1495,7 +1714,7 @@
             </a:ln>
             <a:extLst>
               <a:ext uri="{91240B29-F687-4f45-9708-019B960494DF}">
-                <a14:hiddenLine xmlns:a14="http://schemas.microsoft.com/office/drawing/2010/main" xmlns="" w="9525">
+                <a14:hiddenLine xmlns="" xmlns:a14="http://schemas.microsoft.com/office/drawing/2010/main" w="9525">
                   <a:solidFill>
                     <a:srgbClr val="000000"/>
                   </a:solidFill>
@@ -1557,7 +1776,7 @@
             </a:ln>
             <a:extLst>
               <a:ext uri="{91240B29-F687-4f45-9708-019B960494DF}">
-                <a14:hiddenLine xmlns:a14="http://schemas.microsoft.com/office/drawing/2010/main" xmlns="" w="9525">
+                <a14:hiddenLine xmlns="" xmlns:a14="http://schemas.microsoft.com/office/drawing/2010/main" w="9525">
                   <a:solidFill>
                     <a:srgbClr val="000000"/>
                   </a:solidFill>
@@ -1647,7 +1866,7 @@
             </a:ln>
             <a:extLst>
               <a:ext uri="{91240B29-F687-4f45-9708-019B960494DF}">
-                <a14:hiddenLine xmlns:a14="http://schemas.microsoft.com/office/drawing/2010/main" xmlns="" w="9525">
+                <a14:hiddenLine xmlns="" xmlns:a14="http://schemas.microsoft.com/office/drawing/2010/main" w="9525">
                   <a:solidFill>
                     <a:srgbClr val="000000"/>
                   </a:solidFill>
@@ -1737,7 +1956,7 @@
             </a:ln>
             <a:extLst>
               <a:ext uri="{91240B29-F687-4f45-9708-019B960494DF}">
-                <a14:hiddenLine xmlns:a14="http://schemas.microsoft.com/office/drawing/2010/main" xmlns="" w="9525">
+                <a14:hiddenLine xmlns="" xmlns:a14="http://schemas.microsoft.com/office/drawing/2010/main" w="9525">
                   <a:solidFill>
                     <a:srgbClr val="000000"/>
                   </a:solidFill>
@@ -1793,7 +2012,7 @@
             </a:ln>
             <a:extLst>
               <a:ext uri="{91240B29-F687-4f45-9708-019B960494DF}">
-                <a14:hiddenLine xmlns:a14="http://schemas.microsoft.com/office/drawing/2010/main" xmlns="" w="9525">
+                <a14:hiddenLine xmlns="" xmlns:a14="http://schemas.microsoft.com/office/drawing/2010/main" w="9525">
                   <a:solidFill>
                     <a:srgbClr val="000000"/>
                   </a:solidFill>
@@ -1883,7 +2102,7 @@
             </a:ln>
             <a:extLst>
               <a:ext uri="{91240B29-F687-4f45-9708-019B960494DF}">
-                <a14:hiddenLine xmlns:a14="http://schemas.microsoft.com/office/drawing/2010/main" xmlns="" w="9525">
+                <a14:hiddenLine xmlns="" xmlns:a14="http://schemas.microsoft.com/office/drawing/2010/main" w="9525">
                   <a:solidFill>
                     <a:srgbClr val="000000"/>
                   </a:solidFill>
@@ -1939,7 +2158,7 @@
             </a:ln>
             <a:extLst>
               <a:ext uri="{91240B29-F687-4f45-9708-019B960494DF}">
-                <a14:hiddenLine xmlns:a14="http://schemas.microsoft.com/office/drawing/2010/main" xmlns="" w="9525">
+                <a14:hiddenLine xmlns="" xmlns:a14="http://schemas.microsoft.com/office/drawing/2010/main" w="9525">
                   <a:solidFill>
                     <a:srgbClr val="000000"/>
                   </a:solidFill>
@@ -2029,7 +2248,7 @@
             </a:ln>
             <a:extLst>
               <a:ext uri="{91240B29-F687-4f45-9708-019B960494DF}">
-                <a14:hiddenLine xmlns:a14="http://schemas.microsoft.com/office/drawing/2010/main" xmlns="" w="9525">
+                <a14:hiddenLine xmlns="" xmlns:a14="http://schemas.microsoft.com/office/drawing/2010/main" w="9525">
                   <a:solidFill>
                     <a:srgbClr val="000000"/>
                   </a:solidFill>
@@ -2097,7 +2316,7 @@
             </a:ln>
             <a:extLst>
               <a:ext uri="{91240B29-F687-4f45-9708-019B960494DF}">
-                <a14:hiddenLine xmlns:a14="http://schemas.microsoft.com/office/drawing/2010/main" xmlns="" w="9525">
+                <a14:hiddenLine xmlns="" xmlns:a14="http://schemas.microsoft.com/office/drawing/2010/main" w="9525">
                   <a:solidFill>
                     <a:srgbClr val="000000"/>
                   </a:solidFill>
@@ -2187,7 +2406,7 @@
             </a:ln>
             <a:extLst>
               <a:ext uri="{91240B29-F687-4f45-9708-019B960494DF}">
-                <a14:hiddenLine xmlns:a14="http://schemas.microsoft.com/office/drawing/2010/main" xmlns="" w="9525">
+                <a14:hiddenLine xmlns="" xmlns:a14="http://schemas.microsoft.com/office/drawing/2010/main" w="9525">
                   <a:solidFill>
                     <a:srgbClr val="000000"/>
                   </a:solidFill>
@@ -2255,7 +2474,7 @@
             </a:ln>
             <a:extLst>
               <a:ext uri="{91240B29-F687-4f45-9708-019B960494DF}">
-                <a14:hiddenLine xmlns:a14="http://schemas.microsoft.com/office/drawing/2010/main" xmlns="" w="9525">
+                <a14:hiddenLine xmlns="" xmlns:a14="http://schemas.microsoft.com/office/drawing/2010/main" w="9525">
                   <a:solidFill>
                     <a:srgbClr val="000000"/>
                   </a:solidFill>
@@ -2345,7 +2564,7 @@
             </a:ln>
             <a:extLst>
               <a:ext uri="{91240B29-F687-4f45-9708-019B960494DF}">
-                <a14:hiddenLine xmlns:a14="http://schemas.microsoft.com/office/drawing/2010/main" xmlns="" w="9525">
+                <a14:hiddenLine xmlns="" xmlns:a14="http://schemas.microsoft.com/office/drawing/2010/main" w="9525">
                   <a:solidFill>
                     <a:srgbClr val="000000"/>
                   </a:solidFill>
@@ -2379,7 +2598,7 @@
             </a:ln>
             <a:extLst>
               <a:ext uri="{91240B29-F687-4f45-9708-019B960494DF}">
-                <a14:hiddenLine xmlns:a14="http://schemas.microsoft.com/office/drawing/2010/main" xmlns="" w="9525">
+                <a14:hiddenLine xmlns="" xmlns:a14="http://schemas.microsoft.com/office/drawing/2010/main" w="9525">
                   <a:solidFill>
                     <a:srgbClr val="000000"/>
                   </a:solidFill>
@@ -2469,7 +2688,7 @@
             </a:ln>
             <a:extLst>
               <a:ext uri="{91240B29-F687-4f45-9708-019B960494DF}">
-                <a14:hiddenLine xmlns:a14="http://schemas.microsoft.com/office/drawing/2010/main" xmlns="" w="9525">
+                <a14:hiddenLine xmlns="" xmlns:a14="http://schemas.microsoft.com/office/drawing/2010/main" w="9525">
                   <a:solidFill>
                     <a:srgbClr val="000000"/>
                   </a:solidFill>
@@ -2531,7 +2750,7 @@
             </a:ln>
             <a:extLst>
               <a:ext uri="{91240B29-F687-4f45-9708-019B960494DF}">
-                <a14:hiddenLine xmlns:a14="http://schemas.microsoft.com/office/drawing/2010/main" xmlns="" w="9525">
+                <a14:hiddenLine xmlns="" xmlns:a14="http://schemas.microsoft.com/office/drawing/2010/main" w="9525">
                   <a:solidFill>
                     <a:srgbClr val="000000"/>
                   </a:solidFill>
@@ -2593,7 +2812,7 @@
             </a:ln>
             <a:extLst>
               <a:ext uri="{91240B29-F687-4f45-9708-019B960494DF}">
-                <a14:hiddenLine xmlns:a14="http://schemas.microsoft.com/office/drawing/2010/main" xmlns="" w="9525">
+                <a14:hiddenLine xmlns="" xmlns:a14="http://schemas.microsoft.com/office/drawing/2010/main" w="9525">
                   <a:solidFill>
                     <a:srgbClr val="000000"/>
                   </a:solidFill>
@@ -2683,7 +2902,7 @@
             </a:ln>
             <a:extLst>
               <a:ext uri="{91240B29-F687-4f45-9708-019B960494DF}">
-                <a14:hiddenLine xmlns:a14="http://schemas.microsoft.com/office/drawing/2010/main" xmlns="" w="9525">
+                <a14:hiddenLine xmlns="" xmlns:a14="http://schemas.microsoft.com/office/drawing/2010/main" w="9525">
                   <a:solidFill>
                     <a:srgbClr val="000000"/>
                   </a:solidFill>
@@ -2751,7 +2970,7 @@
             </a:ln>
             <a:extLst>
               <a:ext uri="{91240B29-F687-4f45-9708-019B960494DF}">
-                <a14:hiddenLine xmlns:a14="http://schemas.microsoft.com/office/drawing/2010/main" xmlns="" w="9525">
+                <a14:hiddenLine xmlns="" xmlns:a14="http://schemas.microsoft.com/office/drawing/2010/main" w="9525">
                   <a:solidFill>
                     <a:srgbClr val="000000"/>
                   </a:solidFill>
@@ -2813,7 +3032,7 @@
             </a:ln>
             <a:extLst>
               <a:ext uri="{91240B29-F687-4f45-9708-019B960494DF}">
-                <a14:hiddenLine xmlns:a14="http://schemas.microsoft.com/office/drawing/2010/main" xmlns="" w="9525">
+                <a14:hiddenLine xmlns="" xmlns:a14="http://schemas.microsoft.com/office/drawing/2010/main" w="9525">
                   <a:solidFill>
                     <a:srgbClr val="000000"/>
                   </a:solidFill>
@@ -2903,7 +3122,7 @@
             </a:ln>
             <a:extLst>
               <a:ext uri="{91240B29-F687-4f45-9708-019B960494DF}">
-                <a14:hiddenLine xmlns:a14="http://schemas.microsoft.com/office/drawing/2010/main" xmlns="" w="9525">
+                <a14:hiddenLine xmlns="" xmlns:a14="http://schemas.microsoft.com/office/drawing/2010/main" w="9525">
                   <a:solidFill>
                     <a:srgbClr val="000000"/>
                   </a:solidFill>
@@ -2965,7 +3184,7 @@
             </a:ln>
             <a:extLst>
               <a:ext uri="{91240B29-F687-4f45-9708-019B960494DF}">
-                <a14:hiddenLine xmlns:a14="http://schemas.microsoft.com/office/drawing/2010/main" xmlns="" w="9525">
+                <a14:hiddenLine xmlns="" xmlns:a14="http://schemas.microsoft.com/office/drawing/2010/main" w="9525">
                   <a:solidFill>
                     <a:srgbClr val="000000"/>
                   </a:solidFill>
@@ -3055,7 +3274,7 @@
             </a:ln>
             <a:extLst>
               <a:ext uri="{91240B29-F687-4f45-9708-019B960494DF}">
-                <a14:hiddenLine xmlns:a14="http://schemas.microsoft.com/office/drawing/2010/main" xmlns="" w="9525">
+                <a14:hiddenLine xmlns="" xmlns:a14="http://schemas.microsoft.com/office/drawing/2010/main" w="9525">
                   <a:solidFill>
                     <a:srgbClr val="000000"/>
                   </a:solidFill>
@@ -3117,7 +3336,7 @@
             </a:ln>
             <a:extLst>
               <a:ext uri="{91240B29-F687-4f45-9708-019B960494DF}">
-                <a14:hiddenLine xmlns:a14="http://schemas.microsoft.com/office/drawing/2010/main" xmlns="" w="9525">
+                <a14:hiddenLine xmlns="" xmlns:a14="http://schemas.microsoft.com/office/drawing/2010/main" w="9525">
                   <a:solidFill>
                     <a:srgbClr val="000000"/>
                   </a:solidFill>
@@ -3207,7 +3426,7 @@
             </a:ln>
             <a:extLst>
               <a:ext uri="{91240B29-F687-4f45-9708-019B960494DF}">
-                <a14:hiddenLine xmlns:a14="http://schemas.microsoft.com/office/drawing/2010/main" xmlns="" w="9525">
+                <a14:hiddenLine xmlns="" xmlns:a14="http://schemas.microsoft.com/office/drawing/2010/main" w="9525">
                   <a:solidFill>
                     <a:srgbClr val="000000"/>
                   </a:solidFill>
@@ -3241,7 +3460,7 @@
             </a:ln>
             <a:extLst>
               <a:ext uri="{91240B29-F687-4f45-9708-019B960494DF}">
-                <a14:hiddenLine xmlns:a14="http://schemas.microsoft.com/office/drawing/2010/main" xmlns="" w="9525">
+                <a14:hiddenLine xmlns="" xmlns:a14="http://schemas.microsoft.com/office/drawing/2010/main" w="9525">
                   <a:solidFill>
                     <a:srgbClr val="000000"/>
                   </a:solidFill>
@@ -3306,7 +3525,7 @@
             </a:ln>
             <a:extLst>
               <a:ext uri="{91240B29-F687-4f45-9708-019B960494DF}">
-                <a14:hiddenLine xmlns:a14="http://schemas.microsoft.com/office/drawing/2010/main" xmlns="" w="9525">
+                <a14:hiddenLine xmlns="" xmlns:a14="http://schemas.microsoft.com/office/drawing/2010/main" w="9525">
                   <a:solidFill>
                     <a:srgbClr val="000000"/>
                   </a:solidFill>
@@ -3396,7 +3615,7 @@
             </a:ln>
             <a:extLst>
               <a:ext uri="{91240B29-F687-4f45-9708-019B960494DF}">
-                <a14:hiddenLine xmlns:a14="http://schemas.microsoft.com/office/drawing/2010/main" xmlns="" w="9525">
+                <a14:hiddenLine xmlns="" xmlns:a14="http://schemas.microsoft.com/office/drawing/2010/main" w="9525">
                   <a:solidFill>
                     <a:srgbClr val="000000"/>
                   </a:solidFill>
@@ -3458,7 +3677,7 @@
             </a:ln>
             <a:extLst>
               <a:ext uri="{91240B29-F687-4f45-9708-019B960494DF}">
-                <a14:hiddenLine xmlns:a14="http://schemas.microsoft.com/office/drawing/2010/main" xmlns="" w="9525">
+                <a14:hiddenLine xmlns="" xmlns:a14="http://schemas.microsoft.com/office/drawing/2010/main" w="9525">
                   <a:solidFill>
                     <a:srgbClr val="000000"/>
                   </a:solidFill>
@@ -3548,7 +3767,7 @@
             </a:ln>
             <a:extLst>
               <a:ext uri="{91240B29-F687-4f45-9708-019B960494DF}">
-                <a14:hiddenLine xmlns:a14="http://schemas.microsoft.com/office/drawing/2010/main" xmlns="" w="9525">
+                <a14:hiddenLine xmlns="" xmlns:a14="http://schemas.microsoft.com/office/drawing/2010/main" w="9525">
                   <a:solidFill>
                     <a:srgbClr val="000000"/>
                   </a:solidFill>
@@ -3638,7 +3857,7 @@
             </a:ln>
             <a:extLst>
               <a:ext uri="{91240B29-F687-4f45-9708-019B960494DF}">
-                <a14:hiddenLine xmlns:a14="http://schemas.microsoft.com/office/drawing/2010/main" xmlns="" w="9525">
+                <a14:hiddenLine xmlns="" xmlns:a14="http://schemas.microsoft.com/office/drawing/2010/main" w="9525">
                   <a:solidFill>
                     <a:srgbClr val="000000"/>
                   </a:solidFill>
@@ -3703,7 +3922,7 @@
             </a:ln>
             <a:extLst>
               <a:ext uri="{91240B29-F687-4f45-9708-019B960494DF}">
-                <a14:hiddenLine xmlns:a14="http://schemas.microsoft.com/office/drawing/2010/main" xmlns="" w="9525">
+                <a14:hiddenLine xmlns="" xmlns:a14="http://schemas.microsoft.com/office/drawing/2010/main" w="9525">
                   <a:solidFill>
                     <a:srgbClr val="000000"/>
                   </a:solidFill>
@@ -3765,7 +3984,7 @@
             </a:ln>
             <a:extLst>
               <a:ext uri="{91240B29-F687-4f45-9708-019B960494DF}">
-                <a14:hiddenLine xmlns:a14="http://schemas.microsoft.com/office/drawing/2010/main" xmlns="" w="9525">
+                <a14:hiddenLine xmlns="" xmlns:a14="http://schemas.microsoft.com/office/drawing/2010/main" w="9525">
                   <a:solidFill>
                     <a:srgbClr val="000000"/>
                   </a:solidFill>
@@ -3855,7 +4074,7 @@
             </a:ln>
             <a:extLst>
               <a:ext uri="{91240B29-F687-4f45-9708-019B960494DF}">
-                <a14:hiddenLine xmlns:a14="http://schemas.microsoft.com/office/drawing/2010/main" xmlns="" w="9525">
+                <a14:hiddenLine xmlns="" xmlns:a14="http://schemas.microsoft.com/office/drawing/2010/main" w="9525">
                   <a:solidFill>
                     <a:srgbClr val="000000"/>
                   </a:solidFill>
@@ -3945,7 +4164,7 @@
             </a:ln>
             <a:extLst>
               <a:ext uri="{91240B29-F687-4f45-9708-019B960494DF}">
-                <a14:hiddenLine xmlns:a14="http://schemas.microsoft.com/office/drawing/2010/main" xmlns="" w="9525">
+                <a14:hiddenLine xmlns="" xmlns:a14="http://schemas.microsoft.com/office/drawing/2010/main" w="9525">
                   <a:solidFill>
                     <a:srgbClr val="000000"/>
                   </a:solidFill>
@@ -4007,7 +4226,7 @@
             </a:ln>
             <a:extLst>
               <a:ext uri="{91240B29-F687-4f45-9708-019B960494DF}">
-                <a14:hiddenLine xmlns:a14="http://schemas.microsoft.com/office/drawing/2010/main" xmlns="" w="9525">
+                <a14:hiddenLine xmlns="" xmlns:a14="http://schemas.microsoft.com/office/drawing/2010/main" w="9525">
                   <a:solidFill>
                     <a:srgbClr val="000000"/>
                   </a:solidFill>
@@ -4127,7 +4346,7 @@
             </a:ln>
             <a:extLst>
               <a:ext uri="{91240B29-F687-4f45-9708-019B960494DF}">
-                <a14:hiddenLine xmlns:a14="http://schemas.microsoft.com/office/drawing/2010/main" xmlns="" w="9525">
+                <a14:hiddenLine xmlns="" xmlns:a14="http://schemas.microsoft.com/office/drawing/2010/main" w="9525">
                   <a:solidFill>
                     <a:srgbClr val="000000"/>
                   </a:solidFill>
@@ -4195,7 +4414,7 @@
             </a:ln>
             <a:extLst>
               <a:ext uri="{91240B29-F687-4f45-9708-019B960494DF}">
-                <a14:hiddenLine xmlns:a14="http://schemas.microsoft.com/office/drawing/2010/main" xmlns="" w="9525">
+                <a14:hiddenLine xmlns="" xmlns:a14="http://schemas.microsoft.com/office/drawing/2010/main" w="9525">
                   <a:solidFill>
                     <a:srgbClr val="000000"/>
                   </a:solidFill>
@@ -4285,7 +4504,7 @@
             </a:ln>
             <a:extLst>
               <a:ext uri="{91240B29-F687-4f45-9708-019B960494DF}">
-                <a14:hiddenLine xmlns:a14="http://schemas.microsoft.com/office/drawing/2010/main" xmlns="" w="9525">
+                <a14:hiddenLine xmlns="" xmlns:a14="http://schemas.microsoft.com/office/drawing/2010/main" w="9525">
                   <a:solidFill>
                     <a:srgbClr val="000000"/>
                   </a:solidFill>
@@ -4425,7 +4644,7 @@
           <a:p>
             <a:fld id="{1FB9FF3F-4980-497D-AFB6-E1538EF32FC7}" type="datetimeFigureOut">
               <a:rPr lang="en-IN" smtClean="0"/>
-              <a:t>11-12-2022</a:t>
+              <a:t>12-12-2022</a:t>
             </a:fld>
             <a:endParaRPr lang="en-IN"/>
           </a:p>
@@ -4692,7 +4911,7 @@
           <a:p>
             <a:fld id="{1FB9FF3F-4980-497D-AFB6-E1538EF32FC7}" type="datetimeFigureOut">
               <a:rPr lang="en-IN" smtClean="0"/>
-              <a:t>11-12-2022</a:t>
+              <a:t>12-12-2022</a:t>
             </a:fld>
             <a:endParaRPr lang="en-IN"/>
           </a:p>
@@ -4888,7 +5107,7 @@
           <a:p>
             <a:fld id="{1FB9FF3F-4980-497D-AFB6-E1538EF32FC7}" type="datetimeFigureOut">
               <a:rPr lang="en-IN" smtClean="0"/>
-              <a:t>11-12-2022</a:t>
+              <a:t>12-12-2022</a:t>
             </a:fld>
             <a:endParaRPr lang="en-IN"/>
           </a:p>
@@ -5151,7 +5370,7 @@
           <a:p>
             <a:fld id="{1FB9FF3F-4980-497D-AFB6-E1538EF32FC7}" type="datetimeFigureOut">
               <a:rPr lang="en-IN" smtClean="0"/>
-              <a:t>11-12-2022</a:t>
+              <a:t>12-12-2022</a:t>
             </a:fld>
             <a:endParaRPr lang="en-IN"/>
           </a:p>
@@ -5585,7 +5804,7 @@
           <a:p>
             <a:fld id="{1FB9FF3F-4980-497D-AFB6-E1538EF32FC7}" type="datetimeFigureOut">
               <a:rPr lang="en-IN" smtClean="0"/>
-              <a:t>11-12-2022</a:t>
+              <a:t>12-12-2022</a:t>
             </a:fld>
             <a:endParaRPr lang="en-IN"/>
           </a:p>
@@ -6131,7 +6350,7 @@
           <a:p>
             <a:fld id="{1FB9FF3F-4980-497D-AFB6-E1538EF32FC7}" type="datetimeFigureOut">
               <a:rPr lang="en-IN" smtClean="0"/>
-              <a:t>11-12-2022</a:t>
+              <a:t>12-12-2022</a:t>
             </a:fld>
             <a:endParaRPr lang="en-IN"/>
           </a:p>
@@ -6851,7 +7070,7 @@
           <a:p>
             <a:fld id="{1FB9FF3F-4980-497D-AFB6-E1538EF32FC7}" type="datetimeFigureOut">
               <a:rPr lang="en-IN" smtClean="0"/>
-              <a:t>11-12-2022</a:t>
+              <a:t>12-12-2022</a:t>
             </a:fld>
             <a:endParaRPr lang="en-IN"/>
           </a:p>
@@ -7021,7 +7240,7 @@
           <a:p>
             <a:fld id="{1FB9FF3F-4980-497D-AFB6-E1538EF32FC7}" type="datetimeFigureOut">
               <a:rPr lang="en-IN" smtClean="0"/>
-              <a:t>11-12-2022</a:t>
+              <a:t>12-12-2022</a:t>
             </a:fld>
             <a:endParaRPr lang="en-IN"/>
           </a:p>
@@ -7201,7 +7420,7 @@
           <a:p>
             <a:fld id="{1FB9FF3F-4980-497D-AFB6-E1538EF32FC7}" type="datetimeFigureOut">
               <a:rPr lang="en-IN" smtClean="0"/>
-              <a:t>11-12-2022</a:t>
+              <a:t>12-12-2022</a:t>
             </a:fld>
             <a:endParaRPr lang="en-IN"/>
           </a:p>
@@ -7371,7 +7590,7 @@
           <a:p>
             <a:fld id="{1FB9FF3F-4980-497D-AFB6-E1538EF32FC7}" type="datetimeFigureOut">
               <a:rPr lang="en-IN" smtClean="0"/>
-              <a:t>11-12-2022</a:t>
+              <a:t>12-12-2022</a:t>
             </a:fld>
             <a:endParaRPr lang="en-IN"/>
           </a:p>
@@ -7621,7 +7840,7 @@
           <a:p>
             <a:fld id="{1FB9FF3F-4980-497D-AFB6-E1538EF32FC7}" type="datetimeFigureOut">
               <a:rPr lang="en-IN" smtClean="0"/>
-              <a:t>11-12-2022</a:t>
+              <a:t>12-12-2022</a:t>
             </a:fld>
             <a:endParaRPr lang="en-IN"/>
           </a:p>
@@ -7853,7 +8072,7 @@
           <a:p>
             <a:fld id="{1FB9FF3F-4980-497D-AFB6-E1538EF32FC7}" type="datetimeFigureOut">
               <a:rPr lang="en-IN" smtClean="0"/>
-              <a:t>11-12-2022</a:t>
+              <a:t>12-12-2022</a:t>
             </a:fld>
             <a:endParaRPr lang="en-IN"/>
           </a:p>
@@ -8234,7 +8453,7 @@
           <a:p>
             <a:fld id="{1FB9FF3F-4980-497D-AFB6-E1538EF32FC7}" type="datetimeFigureOut">
               <a:rPr lang="en-IN" smtClean="0"/>
-              <a:t>11-12-2022</a:t>
+              <a:t>12-12-2022</a:t>
             </a:fld>
             <a:endParaRPr lang="en-IN"/>
           </a:p>
@@ -8352,7 +8571,7 @@
           <a:p>
             <a:fld id="{1FB9FF3F-4980-497D-AFB6-E1538EF32FC7}" type="datetimeFigureOut">
               <a:rPr lang="en-IN" smtClean="0"/>
-              <a:t>11-12-2022</a:t>
+              <a:t>12-12-2022</a:t>
             </a:fld>
             <a:endParaRPr lang="en-IN"/>
           </a:p>
@@ -8447,7 +8666,7 @@
           <a:p>
             <a:fld id="{1FB9FF3F-4980-497D-AFB6-E1538EF32FC7}" type="datetimeFigureOut">
               <a:rPr lang="en-IN" smtClean="0"/>
-              <a:t>11-12-2022</a:t>
+              <a:t>12-12-2022</a:t>
             </a:fld>
             <a:endParaRPr lang="en-IN"/>
           </a:p>
@@ -8696,7 +8915,7 @@
           <a:p>
             <a:fld id="{1FB9FF3F-4980-497D-AFB6-E1538EF32FC7}" type="datetimeFigureOut">
               <a:rPr lang="en-IN" smtClean="0"/>
-              <a:t>11-12-2022</a:t>
+              <a:t>12-12-2022</a:t>
             </a:fld>
             <a:endParaRPr lang="en-IN"/>
           </a:p>
@@ -8976,7 +9195,7 @@
           <a:p>
             <a:fld id="{1FB9FF3F-4980-497D-AFB6-E1538EF32FC7}" type="datetimeFigureOut">
               <a:rPr lang="en-IN" smtClean="0"/>
-              <a:t>11-12-2022</a:t>
+              <a:t>12-12-2022</a:t>
             </a:fld>
             <a:endParaRPr lang="en-IN"/>
           </a:p>
@@ -9092,7 +9311,7 @@
           <a:noFill/>
           <a:extLst>
             <a:ext uri="{909E8E84-426E-40dd-AFC4-6F175D3DCCD1}">
-              <a14:hiddenFill xmlns:a14="http://schemas.microsoft.com/office/drawing/2010/main" xmlns="">
+              <a14:hiddenFill xmlns="" xmlns:a14="http://schemas.microsoft.com/office/drawing/2010/main">
                 <a:solidFill>
                   <a:srgbClr val="FFFFFF"/>
                 </a:solidFill>
@@ -9166,7 +9385,7 @@
               </a:ln>
               <a:extLst>
                 <a:ext uri="{91240B29-F687-4f45-9708-019B960494DF}">
-                  <a14:hiddenLine xmlns:a14="http://schemas.microsoft.com/office/drawing/2010/main" xmlns="" w="9525">
+                  <a14:hiddenLine xmlns="" xmlns:a14="http://schemas.microsoft.com/office/drawing/2010/main" w="9525">
                     <a:solidFill>
                       <a:srgbClr val="000000"/>
                     </a:solidFill>
@@ -9256,7 +9475,7 @@
               </a:ln>
               <a:extLst>
                 <a:ext uri="{91240B29-F687-4f45-9708-019B960494DF}">
-                  <a14:hiddenLine xmlns:a14="http://schemas.microsoft.com/office/drawing/2010/main" xmlns="" w="9525">
+                  <a14:hiddenLine xmlns="" xmlns:a14="http://schemas.microsoft.com/office/drawing/2010/main" w="9525">
                     <a:solidFill>
                       <a:srgbClr val="000000"/>
                     </a:solidFill>
@@ -9346,7 +9565,7 @@
               </a:ln>
               <a:extLst>
                 <a:ext uri="{91240B29-F687-4f45-9708-019B960494DF}">
-                  <a14:hiddenLine xmlns:a14="http://schemas.microsoft.com/office/drawing/2010/main" xmlns="" w="9525">
+                  <a14:hiddenLine xmlns="" xmlns:a14="http://schemas.microsoft.com/office/drawing/2010/main" w="9525">
                     <a:solidFill>
                       <a:srgbClr val="000000"/>
                     </a:solidFill>
@@ -9408,7 +9627,7 @@
               </a:ln>
               <a:extLst>
                 <a:ext uri="{91240B29-F687-4f45-9708-019B960494DF}">
-                  <a14:hiddenLine xmlns:a14="http://schemas.microsoft.com/office/drawing/2010/main" xmlns="" w="9525">
+                  <a14:hiddenLine xmlns="" xmlns:a14="http://schemas.microsoft.com/office/drawing/2010/main" w="9525">
                     <a:solidFill>
                       <a:srgbClr val="000000"/>
                     </a:solidFill>
@@ -9498,7 +9717,7 @@
               </a:ln>
               <a:extLst>
                 <a:ext uri="{91240B29-F687-4f45-9708-019B960494DF}">
-                  <a14:hiddenLine xmlns:a14="http://schemas.microsoft.com/office/drawing/2010/main" xmlns="" w="9525">
+                  <a14:hiddenLine xmlns="" xmlns:a14="http://schemas.microsoft.com/office/drawing/2010/main" w="9525">
                     <a:solidFill>
                       <a:srgbClr val="000000"/>
                     </a:solidFill>
@@ -9560,7 +9779,7 @@
               </a:ln>
               <a:extLst>
                 <a:ext uri="{91240B29-F687-4f45-9708-019B960494DF}">
-                  <a14:hiddenLine xmlns:a14="http://schemas.microsoft.com/office/drawing/2010/main" xmlns="" w="9525">
+                  <a14:hiddenLine xmlns="" xmlns:a14="http://schemas.microsoft.com/office/drawing/2010/main" w="9525">
                     <a:solidFill>
                       <a:srgbClr val="000000"/>
                     </a:solidFill>
@@ -9622,7 +9841,7 @@
               </a:ln>
               <a:extLst>
                 <a:ext uri="{91240B29-F687-4f45-9708-019B960494DF}">
-                  <a14:hiddenLine xmlns:a14="http://schemas.microsoft.com/office/drawing/2010/main" xmlns="" w="9525">
+                  <a14:hiddenLine xmlns="" xmlns:a14="http://schemas.microsoft.com/office/drawing/2010/main" w="9525">
                     <a:solidFill>
                       <a:srgbClr val="000000"/>
                     </a:solidFill>
@@ -9712,7 +9931,7 @@
               </a:ln>
               <a:extLst>
                 <a:ext uri="{91240B29-F687-4f45-9708-019B960494DF}">
-                  <a14:hiddenLine xmlns:a14="http://schemas.microsoft.com/office/drawing/2010/main" xmlns="" w="9525">
+                  <a14:hiddenLine xmlns="" xmlns:a14="http://schemas.microsoft.com/office/drawing/2010/main" w="9525">
                     <a:solidFill>
                       <a:srgbClr val="000000"/>
                     </a:solidFill>
@@ -9802,7 +10021,7 @@
               </a:ln>
               <a:extLst>
                 <a:ext uri="{91240B29-F687-4f45-9708-019B960494DF}">
-                  <a14:hiddenLine xmlns:a14="http://schemas.microsoft.com/office/drawing/2010/main" xmlns="" w="9525">
+                  <a14:hiddenLine xmlns="" xmlns:a14="http://schemas.microsoft.com/office/drawing/2010/main" w="9525">
                     <a:solidFill>
                       <a:srgbClr val="000000"/>
                     </a:solidFill>
@@ -9864,7 +10083,7 @@
               </a:ln>
               <a:extLst>
                 <a:ext uri="{91240B29-F687-4f45-9708-019B960494DF}">
-                  <a14:hiddenLine xmlns:a14="http://schemas.microsoft.com/office/drawing/2010/main" xmlns="" w="9525">
+                  <a14:hiddenLine xmlns="" xmlns:a14="http://schemas.microsoft.com/office/drawing/2010/main" w="9525">
                     <a:solidFill>
                       <a:srgbClr val="000000"/>
                     </a:solidFill>
@@ -9974,7 +10193,7 @@
               </a:ln>
               <a:extLst>
                 <a:ext uri="{91240B29-F687-4f45-9708-019B960494DF}">
-                  <a14:hiddenLine xmlns:a14="http://schemas.microsoft.com/office/drawing/2010/main" xmlns="" w="9525">
+                  <a14:hiddenLine xmlns="" xmlns:a14="http://schemas.microsoft.com/office/drawing/2010/main" w="9525">
                     <a:solidFill>
                       <a:srgbClr val="000000"/>
                     </a:solidFill>
@@ -10058,7 +10277,7 @@
               </a:ln>
               <a:extLst>
                 <a:ext uri="{91240B29-F687-4f45-9708-019B960494DF}">
-                  <a14:hiddenLine xmlns:a14="http://schemas.microsoft.com/office/drawing/2010/main" xmlns="" w="9525">
+                  <a14:hiddenLine xmlns="" xmlns:a14="http://schemas.microsoft.com/office/drawing/2010/main" w="9525">
                     <a:solidFill>
                       <a:srgbClr val="000000"/>
                     </a:solidFill>
@@ -10120,7 +10339,7 @@
               </a:ln>
               <a:extLst>
                 <a:ext uri="{91240B29-F687-4f45-9708-019B960494DF}">
-                  <a14:hiddenLine xmlns:a14="http://schemas.microsoft.com/office/drawing/2010/main" xmlns="" w="9525">
+                  <a14:hiddenLine xmlns="" xmlns:a14="http://schemas.microsoft.com/office/drawing/2010/main" w="9525">
                     <a:solidFill>
                       <a:srgbClr val="000000"/>
                     </a:solidFill>
@@ -10182,7 +10401,7 @@
               </a:ln>
               <a:extLst>
                 <a:ext uri="{91240B29-F687-4f45-9708-019B960494DF}">
-                  <a14:hiddenLine xmlns:a14="http://schemas.microsoft.com/office/drawing/2010/main" xmlns="" w="9525">
+                  <a14:hiddenLine xmlns="" xmlns:a14="http://schemas.microsoft.com/office/drawing/2010/main" w="9525">
                     <a:solidFill>
                       <a:srgbClr val="000000"/>
                     </a:solidFill>
@@ -10272,7 +10491,7 @@
               </a:ln>
               <a:extLst>
                 <a:ext uri="{91240B29-F687-4f45-9708-019B960494DF}">
-                  <a14:hiddenLine xmlns:a14="http://schemas.microsoft.com/office/drawing/2010/main" xmlns="" w="9525">
+                  <a14:hiddenLine xmlns="" xmlns:a14="http://schemas.microsoft.com/office/drawing/2010/main" w="9525">
                     <a:solidFill>
                       <a:srgbClr val="000000"/>
                     </a:solidFill>
@@ -10306,7 +10525,7 @@
               </a:ln>
               <a:extLst>
                 <a:ext uri="{91240B29-F687-4f45-9708-019B960494DF}">
-                  <a14:hiddenLine xmlns:a14="http://schemas.microsoft.com/office/drawing/2010/main" xmlns="" w="9525">
+                  <a14:hiddenLine xmlns="" xmlns:a14="http://schemas.microsoft.com/office/drawing/2010/main" w="9525">
                     <a:solidFill>
                       <a:srgbClr val="000000"/>
                     </a:solidFill>
@@ -10371,7 +10590,7 @@
               </a:ln>
               <a:extLst>
                 <a:ext uri="{91240B29-F687-4f45-9708-019B960494DF}">
-                  <a14:hiddenLine xmlns:a14="http://schemas.microsoft.com/office/drawing/2010/main" xmlns="" w="9525">
+                  <a14:hiddenLine xmlns="" xmlns:a14="http://schemas.microsoft.com/office/drawing/2010/main" w="9525">
                     <a:solidFill>
                       <a:srgbClr val="000000"/>
                     </a:solidFill>
@@ -10461,7 +10680,7 @@
               </a:ln>
               <a:extLst>
                 <a:ext uri="{91240B29-F687-4f45-9708-019B960494DF}">
-                  <a14:hiddenLine xmlns:a14="http://schemas.microsoft.com/office/drawing/2010/main" xmlns="" w="9525">
+                  <a14:hiddenLine xmlns="" xmlns:a14="http://schemas.microsoft.com/office/drawing/2010/main" w="9525">
                     <a:solidFill>
                       <a:srgbClr val="000000"/>
                     </a:solidFill>
@@ -10523,7 +10742,7 @@
               </a:ln>
               <a:extLst>
                 <a:ext uri="{91240B29-F687-4f45-9708-019B960494DF}">
-                  <a14:hiddenLine xmlns:a14="http://schemas.microsoft.com/office/drawing/2010/main" xmlns="" w="9525">
+                  <a14:hiddenLine xmlns="" xmlns:a14="http://schemas.microsoft.com/office/drawing/2010/main" w="9525">
                     <a:solidFill>
                       <a:srgbClr val="000000"/>
                     </a:solidFill>
@@ -10613,7 +10832,7 @@
               </a:ln>
               <a:extLst>
                 <a:ext uri="{91240B29-F687-4f45-9708-019B960494DF}">
-                  <a14:hiddenLine xmlns:a14="http://schemas.microsoft.com/office/drawing/2010/main" xmlns="" w="9525">
+                  <a14:hiddenLine xmlns="" xmlns:a14="http://schemas.microsoft.com/office/drawing/2010/main" w="9525">
                     <a:solidFill>
                       <a:srgbClr val="000000"/>
                     </a:solidFill>
@@ -10678,7 +10897,7 @@
               </a:ln>
               <a:extLst>
                 <a:ext uri="{91240B29-F687-4f45-9708-019B960494DF}">
-                  <a14:hiddenLine xmlns:a14="http://schemas.microsoft.com/office/drawing/2010/main" xmlns="" w="9525">
+                  <a14:hiddenLine xmlns="" xmlns:a14="http://schemas.microsoft.com/office/drawing/2010/main" w="9525">
                     <a:solidFill>
                       <a:srgbClr val="000000"/>
                     </a:solidFill>
@@ -10740,7 +10959,7 @@
               </a:ln>
               <a:extLst>
                 <a:ext uri="{91240B29-F687-4f45-9708-019B960494DF}">
-                  <a14:hiddenLine xmlns:a14="http://schemas.microsoft.com/office/drawing/2010/main" xmlns="" w="9525">
+                  <a14:hiddenLine xmlns="" xmlns:a14="http://schemas.microsoft.com/office/drawing/2010/main" w="9525">
                     <a:solidFill>
                       <a:srgbClr val="000000"/>
                     </a:solidFill>
@@ -10830,7 +11049,7 @@
               </a:ln>
               <a:extLst>
                 <a:ext uri="{91240B29-F687-4f45-9708-019B960494DF}">
-                  <a14:hiddenLine xmlns:a14="http://schemas.microsoft.com/office/drawing/2010/main" xmlns="" w="9525">
+                  <a14:hiddenLine xmlns="" xmlns:a14="http://schemas.microsoft.com/office/drawing/2010/main" w="9525">
                     <a:solidFill>
                       <a:srgbClr val="000000"/>
                     </a:solidFill>
@@ -10920,7 +11139,7 @@
               </a:ln>
               <a:extLst>
                 <a:ext uri="{91240B29-F687-4f45-9708-019B960494DF}">
-                  <a14:hiddenLine xmlns:a14="http://schemas.microsoft.com/office/drawing/2010/main" xmlns="" w="9525">
+                  <a14:hiddenLine xmlns="" xmlns:a14="http://schemas.microsoft.com/office/drawing/2010/main" w="9525">
                     <a:solidFill>
                       <a:srgbClr val="000000"/>
                     </a:solidFill>
@@ -10985,7 +11204,7 @@
               </a:ln>
               <a:extLst>
                 <a:ext uri="{91240B29-F687-4f45-9708-019B960494DF}">
-                  <a14:hiddenLine xmlns:a14="http://schemas.microsoft.com/office/drawing/2010/main" xmlns="" w="9525">
+                  <a14:hiddenLine xmlns="" xmlns:a14="http://schemas.microsoft.com/office/drawing/2010/main" w="9525">
                     <a:solidFill>
                       <a:srgbClr val="000000"/>
                     </a:solidFill>
@@ -11105,7 +11324,7 @@
               </a:ln>
               <a:extLst>
                 <a:ext uri="{91240B29-F687-4f45-9708-019B960494DF}">
-                  <a14:hiddenLine xmlns:a14="http://schemas.microsoft.com/office/drawing/2010/main" xmlns="" w="9525">
+                  <a14:hiddenLine xmlns="" xmlns:a14="http://schemas.microsoft.com/office/drawing/2010/main" w="9525">
                     <a:solidFill>
                       <a:srgbClr val="000000"/>
                     </a:solidFill>
@@ -11203,7 +11422,7 @@
               </a:ln>
               <a:extLst>
                 <a:ext uri="{91240B29-F687-4f45-9708-019B960494DF}">
-                  <a14:hiddenLine xmlns:a14="http://schemas.microsoft.com/office/drawing/2010/main" xmlns="" w="9525">
+                  <a14:hiddenLine xmlns="" xmlns:a14="http://schemas.microsoft.com/office/drawing/2010/main" w="9525">
                     <a:solidFill>
                       <a:srgbClr val="000000"/>
                     </a:solidFill>
@@ -11318,7 +11537,7 @@
               </a:ln>
               <a:extLst>
                 <a:ext uri="{91240B29-F687-4f45-9708-019B960494DF}">
-                  <a14:hiddenLine xmlns:a14="http://schemas.microsoft.com/office/drawing/2010/main" xmlns="" w="9525">
+                  <a14:hiddenLine xmlns="" xmlns:a14="http://schemas.microsoft.com/office/drawing/2010/main" w="9525">
                     <a:solidFill>
                       <a:srgbClr val="000000"/>
                     </a:solidFill>
@@ -11408,7 +11627,7 @@
               </a:ln>
               <a:extLst>
                 <a:ext uri="{91240B29-F687-4f45-9708-019B960494DF}">
-                  <a14:hiddenLine xmlns:a14="http://schemas.microsoft.com/office/drawing/2010/main" xmlns="" w="9525">
+                  <a14:hiddenLine xmlns="" xmlns:a14="http://schemas.microsoft.com/office/drawing/2010/main" w="9525">
                     <a:solidFill>
                       <a:srgbClr val="000000"/>
                     </a:solidFill>
@@ -11473,7 +11692,7 @@
               </a:ln>
               <a:extLst>
                 <a:ext uri="{91240B29-F687-4f45-9708-019B960494DF}">
-                  <a14:hiddenLine xmlns:a14="http://schemas.microsoft.com/office/drawing/2010/main" xmlns="" w="9525">
+                  <a14:hiddenLine xmlns="" xmlns:a14="http://schemas.microsoft.com/office/drawing/2010/main" w="9525">
                     <a:solidFill>
                       <a:srgbClr val="000000"/>
                     </a:solidFill>
@@ -11563,7 +11782,7 @@
               </a:ln>
               <a:extLst>
                 <a:ext uri="{91240B29-F687-4f45-9708-019B960494DF}">
-                  <a14:hiddenLine xmlns:a14="http://schemas.microsoft.com/office/drawing/2010/main" xmlns="" w="9525">
+                  <a14:hiddenLine xmlns="" xmlns:a14="http://schemas.microsoft.com/office/drawing/2010/main" w="9525">
                     <a:solidFill>
                       <a:srgbClr val="000000"/>
                     </a:solidFill>
@@ -11631,7 +11850,7 @@
               </a:ln>
               <a:extLst>
                 <a:ext uri="{91240B29-F687-4f45-9708-019B960494DF}">
-                  <a14:hiddenLine xmlns:a14="http://schemas.microsoft.com/office/drawing/2010/main" xmlns="" w="9525">
+                  <a14:hiddenLine xmlns="" xmlns:a14="http://schemas.microsoft.com/office/drawing/2010/main" w="9525">
                     <a:solidFill>
                       <a:srgbClr val="000000"/>
                     </a:solidFill>
@@ -11721,7 +11940,7 @@
               </a:ln>
               <a:extLst>
                 <a:ext uri="{91240B29-F687-4f45-9708-019B960494DF}">
-                  <a14:hiddenLine xmlns:a14="http://schemas.microsoft.com/office/drawing/2010/main" xmlns="" w="9525">
+                  <a14:hiddenLine xmlns="" xmlns:a14="http://schemas.microsoft.com/office/drawing/2010/main" w="9525">
                     <a:solidFill>
                       <a:srgbClr val="000000"/>
                     </a:solidFill>
@@ -11789,7 +12008,7 @@
               </a:ln>
               <a:extLst>
                 <a:ext uri="{91240B29-F687-4f45-9708-019B960494DF}">
-                  <a14:hiddenLine xmlns:a14="http://schemas.microsoft.com/office/drawing/2010/main" xmlns="" w="9525">
+                  <a14:hiddenLine xmlns="" xmlns:a14="http://schemas.microsoft.com/office/drawing/2010/main" w="9525">
                     <a:solidFill>
                       <a:srgbClr val="000000"/>
                     </a:solidFill>
@@ -11879,7 +12098,7 @@
               </a:ln>
               <a:extLst>
                 <a:ext uri="{91240B29-F687-4f45-9708-019B960494DF}">
-                  <a14:hiddenLine xmlns:a14="http://schemas.microsoft.com/office/drawing/2010/main" xmlns="" w="9525">
+                  <a14:hiddenLine xmlns="" xmlns:a14="http://schemas.microsoft.com/office/drawing/2010/main" w="9525">
                     <a:solidFill>
                       <a:srgbClr val="000000"/>
                     </a:solidFill>
@@ -11913,7 +12132,7 @@
               </a:ln>
               <a:extLst>
                 <a:ext uri="{91240B29-F687-4f45-9708-019B960494DF}">
-                  <a14:hiddenLine xmlns:a14="http://schemas.microsoft.com/office/drawing/2010/main" xmlns="" w="9525">
+                  <a14:hiddenLine xmlns="" xmlns:a14="http://schemas.microsoft.com/office/drawing/2010/main" w="9525">
                     <a:solidFill>
                       <a:srgbClr val="000000"/>
                     </a:solidFill>
@@ -12053,7 +12272,7 @@
           <a:p>
             <a:fld id="{1FB9FF3F-4980-497D-AFB6-E1538EF32FC7}" type="datetimeFigureOut">
               <a:rPr lang="en-IN" smtClean="0"/>
-              <a:t>11-12-2022</a:t>
+              <a:t>12-12-2022</a:t>
             </a:fld>
             <a:endParaRPr lang="en-IN"/>
           </a:p>
@@ -12576,12 +12795,26 @@
             <p:ph type="title"/>
           </p:nvPr>
         </p:nvSpPr>
-        <p:spPr/>
-        <p:txBody>
-          <a:bodyPr/>
+        <p:spPr>
+          <a:xfrm>
+            <a:off x="1141413" y="618518"/>
+            <a:ext cx="9905998" cy="553057"/>
+          </a:xfrm>
+        </p:spPr>
+        <p:txBody>
+          <a:bodyPr>
+            <a:normAutofit fontScale="90000"/>
+          </a:bodyPr>
           <a:lstStyle/>
           <a:p>
-            <a:endParaRPr lang="en-IN"/>
+            <a:r>
+              <a:rPr lang="en-US" b="0" i="0" dirty="0">
+                <a:effectLst/>
+                <a:latin typeface="sofia-pro"/>
+              </a:rPr>
+              <a:t>Arrow Function</a:t>
+            </a:r>
+            <a:endParaRPr lang="en-IN" dirty="0"/>
           </a:p>
         </p:txBody>
       </p:sp>
@@ -12601,12 +12834,222 @@
             <p:ph idx="1"/>
           </p:nvPr>
         </p:nvSpPr>
-        <p:spPr/>
-        <p:txBody>
-          <a:bodyPr/>
+        <p:spPr>
+          <a:xfrm>
+            <a:off x="1141412" y="1343025"/>
+            <a:ext cx="9905999" cy="4991100"/>
+          </a:xfrm>
+        </p:spPr>
+        <p:txBody>
+          <a:bodyPr>
+            <a:normAutofit fontScale="70000" lnSpcReduction="20000"/>
+          </a:bodyPr>
           <a:lstStyle/>
           <a:p>
-            <a:endParaRPr lang="en-IN"/>
+            <a:r>
+              <a:rPr lang="en-US" b="1" i="0" dirty="0">
+                <a:effectLst/>
+                <a:latin typeface="sofia-pro"/>
+              </a:rPr>
+              <a:t>Example 1: </a:t>
+            </a:r>
+            <a:r>
+              <a:rPr lang="en-US" b="0" i="0" dirty="0">
+                <a:effectLst/>
+                <a:latin typeface="sofia-pro"/>
+              </a:rPr>
+              <a:t>In this example, we will create program to add two number first using normal function and then using arrow function.</a:t>
+            </a:r>
+          </a:p>
+          <a:p>
+            <a:r>
+              <a:rPr lang="en-US" b="1" i="0" dirty="0">
+                <a:effectLst/>
+                <a:latin typeface="sofia-pro"/>
+              </a:rPr>
+              <a:t>Using normal function:</a:t>
+            </a:r>
+            <a:endParaRPr lang="en-US" dirty="0">
+              <a:latin typeface="sofia-pro"/>
+            </a:endParaRPr>
+          </a:p>
+          <a:p>
+            <a:pPr marL="457200" lvl="1" indent="0">
+              <a:buNone/>
+            </a:pPr>
+            <a:r>
+              <a:rPr lang="en-US" dirty="0"/>
+              <a:t>function </a:t>
+            </a:r>
+            <a:r>
+              <a:rPr lang="en-US" dirty="0" err="1"/>
+              <a:t>myFunction</a:t>
+            </a:r>
+            <a:r>
+              <a:rPr lang="en-US" dirty="0"/>
+              <a:t>(){</a:t>
+            </a:r>
+          </a:p>
+          <a:p>
+            <a:pPr marL="457200" lvl="1" indent="0">
+              <a:buNone/>
+            </a:pPr>
+            <a:r>
+              <a:rPr lang="en-US" dirty="0"/>
+              <a:t>  let a = 5, b = 4;</a:t>
+            </a:r>
+          </a:p>
+          <a:p>
+            <a:pPr marL="457200" lvl="1" indent="0">
+              <a:buNone/>
+            </a:pPr>
+            <a:r>
+              <a:rPr lang="en-US" dirty="0"/>
+              <a:t>  return </a:t>
+            </a:r>
+            <a:r>
+              <a:rPr lang="en-US" dirty="0" err="1"/>
+              <a:t>a+b</a:t>
+            </a:r>
+            <a:r>
+              <a:rPr lang="en-US" dirty="0"/>
+              <a:t>;</a:t>
+            </a:r>
+          </a:p>
+          <a:p>
+            <a:pPr marL="457200" lvl="1" indent="0">
+              <a:buNone/>
+            </a:pPr>
+            <a:r>
+              <a:rPr lang="en-US" dirty="0"/>
+              <a:t>}</a:t>
+            </a:r>
+          </a:p>
+          <a:p>
+            <a:pPr marL="457200" lvl="1" indent="0">
+              <a:buNone/>
+            </a:pPr>
+            <a:r>
+              <a:rPr lang="en-US" dirty="0"/>
+              <a:t>console.log(</a:t>
+            </a:r>
+            <a:r>
+              <a:rPr lang="en-US" dirty="0" err="1"/>
+              <a:t>myFunction</a:t>
+            </a:r>
+            <a:r>
+              <a:rPr lang="en-US" dirty="0"/>
+              <a:t>());	//9</a:t>
+            </a:r>
+          </a:p>
+          <a:p>
+            <a:r>
+              <a:rPr lang="en-US" b="1" i="0" dirty="0">
+                <a:effectLst/>
+                <a:latin typeface="sofia-pro"/>
+              </a:rPr>
+              <a:t>Using arrow function:</a:t>
+            </a:r>
+          </a:p>
+          <a:p>
+            <a:pPr marL="457200" lvl="1" indent="0">
+              <a:buNone/>
+            </a:pPr>
+            <a:r>
+              <a:rPr lang="en-US" dirty="0"/>
+              <a:t>const </a:t>
+            </a:r>
+            <a:r>
+              <a:rPr lang="en-US" dirty="0" err="1"/>
+              <a:t>myFunction</a:t>
+            </a:r>
+            <a:r>
+              <a:rPr lang="en-US" dirty="0"/>
+              <a:t> = () =&gt;{</a:t>
+            </a:r>
+          </a:p>
+          <a:p>
+            <a:pPr marL="457200" lvl="1" indent="0">
+              <a:buNone/>
+            </a:pPr>
+            <a:r>
+              <a:rPr lang="en-US" dirty="0"/>
+              <a:t>  let a = 5, b = 4;</a:t>
+            </a:r>
+          </a:p>
+          <a:p>
+            <a:pPr marL="457200" lvl="1" indent="0">
+              <a:buNone/>
+            </a:pPr>
+            <a:r>
+              <a:rPr lang="en-US" dirty="0"/>
+              <a:t>  return </a:t>
+            </a:r>
+            <a:r>
+              <a:rPr lang="en-US" dirty="0" err="1"/>
+              <a:t>a+b</a:t>
+            </a:r>
+            <a:r>
+              <a:rPr lang="en-US" dirty="0"/>
+              <a:t>;</a:t>
+            </a:r>
+          </a:p>
+          <a:p>
+            <a:pPr marL="457200" lvl="1" indent="0">
+              <a:buNone/>
+            </a:pPr>
+            <a:r>
+              <a:rPr lang="en-US" dirty="0"/>
+              <a:t>}</a:t>
+            </a:r>
+          </a:p>
+          <a:p>
+            <a:pPr marL="457200" lvl="1" indent="0">
+              <a:buNone/>
+            </a:pPr>
+            <a:r>
+              <a:rPr lang="en-US" dirty="0"/>
+              <a:t>console.log(</a:t>
+            </a:r>
+            <a:r>
+              <a:rPr lang="en-US" dirty="0" err="1"/>
+              <a:t>myFunction</a:t>
+            </a:r>
+            <a:r>
+              <a:rPr lang="en-US" dirty="0"/>
+              <a:t>());	//9</a:t>
+            </a:r>
+          </a:p>
+          <a:p>
+            <a:r>
+              <a:rPr lang="en-US" b="1" i="0" dirty="0">
+                <a:effectLst/>
+                <a:latin typeface="sofia-pro"/>
+              </a:rPr>
+              <a:t>Explanation:</a:t>
+            </a:r>
+            <a:r>
+              <a:rPr lang="en-US" b="0" i="0" dirty="0">
+                <a:effectLst/>
+                <a:latin typeface="sofia-pro"/>
+              </a:rPr>
+              <a:t> In the arrow function, we do not write the function keyword, so it is necessary to assign it to some kind of variable like here we have assigned to a constant variable named </a:t>
+            </a:r>
+            <a:r>
+              <a:rPr lang="en-US" b="0" i="0" dirty="0" err="1">
+                <a:effectLst/>
+                <a:latin typeface="sofia-pro"/>
+              </a:rPr>
+              <a:t>myFunction</a:t>
+            </a:r>
+            <a:r>
+              <a:rPr lang="en-US" b="0" i="0" dirty="0">
+                <a:effectLst/>
+                <a:latin typeface="sofia-pro"/>
+              </a:rPr>
+              <a:t>.</a:t>
+            </a:r>
+            <a:endParaRPr lang="en-IN" dirty="0"/>
           </a:p>
         </p:txBody>
       </p:sp>
@@ -12656,12 +13099,26 @@
             <p:ph type="title"/>
           </p:nvPr>
         </p:nvSpPr>
-        <p:spPr/>
-        <p:txBody>
-          <a:bodyPr/>
+        <p:spPr>
+          <a:xfrm>
+            <a:off x="1141413" y="618518"/>
+            <a:ext cx="9905998" cy="543532"/>
+          </a:xfrm>
+        </p:spPr>
+        <p:txBody>
+          <a:bodyPr>
+            <a:normAutofit fontScale="90000"/>
+          </a:bodyPr>
           <a:lstStyle/>
           <a:p>
-            <a:endParaRPr lang="en-IN"/>
+            <a:r>
+              <a:rPr lang="en-US" b="0" i="0" dirty="0">
+                <a:effectLst/>
+                <a:latin typeface="sofia-pro"/>
+              </a:rPr>
+              <a:t>Arrow Function</a:t>
+            </a:r>
+            <a:endParaRPr lang="en-IN" dirty="0"/>
           </a:p>
         </p:txBody>
       </p:sp>
@@ -12681,12 +13138,176 @@
             <p:ph idx="1"/>
           </p:nvPr>
         </p:nvSpPr>
-        <p:spPr/>
-        <p:txBody>
-          <a:bodyPr/>
+        <p:spPr>
+          <a:xfrm>
+            <a:off x="1141412" y="1466850"/>
+            <a:ext cx="9905999" cy="4667250"/>
+          </a:xfrm>
+        </p:spPr>
+        <p:txBody>
+          <a:bodyPr>
+            <a:normAutofit fontScale="77500" lnSpcReduction="20000"/>
+          </a:bodyPr>
           <a:lstStyle/>
           <a:p>
-            <a:endParaRPr lang="en-IN"/>
+            <a:r>
+              <a:rPr lang="en-US" b="1" i="0" dirty="0">
+                <a:effectLst/>
+                <a:latin typeface="sofia-pro"/>
+              </a:rPr>
+              <a:t>Example 2: </a:t>
+            </a:r>
+            <a:r>
+              <a:rPr lang="en-US" b="0" i="0" dirty="0">
+                <a:effectLst/>
+                <a:latin typeface="sofia-pro"/>
+              </a:rPr>
+              <a:t>In this example, we will create program to add two number first using normal function and then using arrow function.</a:t>
+            </a:r>
+          </a:p>
+          <a:p>
+            <a:r>
+              <a:rPr lang="en-US" b="1" i="0" dirty="0">
+                <a:effectLst/>
+                <a:latin typeface="sofia-pro"/>
+              </a:rPr>
+              <a:t>Using normal function:</a:t>
+            </a:r>
+            <a:endParaRPr lang="en-US" dirty="0">
+              <a:latin typeface="sofia-pro"/>
+            </a:endParaRPr>
+          </a:p>
+          <a:p>
+            <a:pPr marL="457200" lvl="1" indent="0">
+              <a:buNone/>
+            </a:pPr>
+            <a:r>
+              <a:rPr lang="en-US" dirty="0"/>
+              <a:t>function </a:t>
+            </a:r>
+            <a:r>
+              <a:rPr lang="en-US" dirty="0" err="1"/>
+              <a:t>myFunction</a:t>
+            </a:r>
+            <a:r>
+              <a:rPr lang="en-US" dirty="0"/>
+              <a:t>(num){</a:t>
+            </a:r>
+          </a:p>
+          <a:p>
+            <a:pPr marL="457200" lvl="1" indent="0">
+              <a:buNone/>
+            </a:pPr>
+            <a:r>
+              <a:rPr lang="en-US" dirty="0"/>
+              <a:t>  return num*num;</a:t>
+            </a:r>
+          </a:p>
+          <a:p>
+            <a:pPr marL="457200" lvl="1" indent="0">
+              <a:buNone/>
+            </a:pPr>
+            <a:r>
+              <a:rPr lang="en-US" dirty="0"/>
+              <a:t>}</a:t>
+            </a:r>
+          </a:p>
+          <a:p>
+            <a:pPr marL="457200" lvl="1" indent="0">
+              <a:buNone/>
+            </a:pPr>
+            <a:r>
+              <a:rPr lang="en-US" dirty="0"/>
+              <a:t>console.log(</a:t>
+            </a:r>
+            <a:r>
+              <a:rPr lang="en-US" dirty="0" err="1"/>
+              <a:t>myFunction</a:t>
+            </a:r>
+            <a:r>
+              <a:rPr lang="en-US" dirty="0"/>
+              <a:t>(4));	//16</a:t>
+            </a:r>
+          </a:p>
+          <a:p>
+            <a:r>
+              <a:rPr lang="en-US" b="1" i="0" dirty="0">
+                <a:effectLst/>
+                <a:latin typeface="sofia-pro"/>
+              </a:rPr>
+              <a:t>Using arrow function:</a:t>
+            </a:r>
+          </a:p>
+          <a:p>
+            <a:pPr marL="457200" lvl="1" indent="0">
+              <a:buNone/>
+            </a:pPr>
+            <a:r>
+              <a:rPr lang="en-US" dirty="0"/>
+              <a:t>const </a:t>
+            </a:r>
+            <a:r>
+              <a:rPr lang="en-US" dirty="0" err="1"/>
+              <a:t>myFunction</a:t>
+            </a:r>
+            <a:r>
+              <a:rPr lang="en-US" dirty="0"/>
+              <a:t> = num =&gt; num*num;</a:t>
+            </a:r>
+          </a:p>
+          <a:p>
+            <a:pPr marL="457200" lvl="1" indent="0">
+              <a:buNone/>
+            </a:pPr>
+            <a:r>
+              <a:rPr lang="en-US" dirty="0"/>
+              <a:t>// Equivalent to const </a:t>
+            </a:r>
+            <a:r>
+              <a:rPr lang="en-US" dirty="0" err="1"/>
+              <a:t>myFunction</a:t>
+            </a:r>
+            <a:r>
+              <a:rPr lang="en-US" dirty="0"/>
+              <a:t> = (num) =&gt;{ return num*num; }</a:t>
+            </a:r>
+          </a:p>
+          <a:p>
+            <a:pPr marL="457200" lvl="1" indent="0">
+              <a:buNone/>
+            </a:pPr>
+            <a:r>
+              <a:rPr lang="en-US" dirty="0"/>
+              <a:t>console.log(</a:t>
+            </a:r>
+            <a:r>
+              <a:rPr lang="en-US" dirty="0" err="1"/>
+              <a:t>myFunction</a:t>
+            </a:r>
+            <a:r>
+              <a:rPr lang="en-US" dirty="0"/>
+              <a:t>(4));	//16</a:t>
+            </a:r>
+          </a:p>
+          <a:p>
+            <a:pPr marL="0" indent="0">
+              <a:buNone/>
+            </a:pPr>
+            <a:r>
+              <a:rPr lang="en-US" b="1" i="0" dirty="0">
+                <a:effectLst/>
+                <a:latin typeface="sofia-pro"/>
+              </a:rPr>
+              <a:t>Explanation: </a:t>
+            </a:r>
+            <a:r>
+              <a:rPr lang="en-US" b="0" i="0" dirty="0">
+                <a:effectLst/>
+                <a:latin typeface="sofia-pro"/>
+              </a:rPr>
+              <a:t>When we have only one return expression in function, arrow syntax provides an easier way to write. We can drop the parenthesis of the parameter and also the return statement along with code blocks braces.</a:t>
+            </a:r>
+            <a:endParaRPr lang="en-IN" dirty="0"/>
           </a:p>
         </p:txBody>
       </p:sp>
@@ -12736,12 +13357,26 @@
             <p:ph type="title"/>
           </p:nvPr>
         </p:nvSpPr>
-        <p:spPr/>
-        <p:txBody>
-          <a:bodyPr/>
+        <p:spPr>
+          <a:xfrm>
+            <a:off x="1141413" y="618518"/>
+            <a:ext cx="9905998" cy="543532"/>
+          </a:xfrm>
+        </p:spPr>
+        <p:txBody>
+          <a:bodyPr>
+            <a:normAutofit fontScale="90000"/>
+          </a:bodyPr>
           <a:lstStyle/>
           <a:p>
-            <a:endParaRPr lang="en-IN"/>
+            <a:r>
+              <a:rPr lang="en-US" b="0" i="0" dirty="0">
+                <a:effectLst/>
+                <a:latin typeface="sofia-pro"/>
+              </a:rPr>
+              <a:t>Arrow Function</a:t>
+            </a:r>
+            <a:endParaRPr lang="en-IN" dirty="0"/>
           </a:p>
         </p:txBody>
       </p:sp>
@@ -12761,12 +13396,211 @@
             <p:ph idx="1"/>
           </p:nvPr>
         </p:nvSpPr>
-        <p:spPr/>
-        <p:txBody>
-          <a:bodyPr/>
+        <p:spPr>
+          <a:xfrm>
+            <a:off x="1141412" y="1485900"/>
+            <a:ext cx="9905999" cy="4657725"/>
+          </a:xfrm>
+        </p:spPr>
+        <p:txBody>
+          <a:bodyPr>
+            <a:normAutofit fontScale="70000" lnSpcReduction="20000"/>
+          </a:bodyPr>
           <a:lstStyle/>
           <a:p>
-            <a:endParaRPr lang="en-IN"/>
+            <a:pPr algn="just"/>
+            <a:r>
+              <a:rPr lang="en-US" b="1" i="0" dirty="0">
+                <a:effectLst/>
+                <a:latin typeface="sofia-pro"/>
+              </a:rPr>
+              <a:t>Limitations of Arrow Functions: </a:t>
+            </a:r>
+            <a:r>
+              <a:rPr lang="en-US" b="0" i="0" dirty="0">
+                <a:effectLst/>
+                <a:latin typeface="sofia-pro"/>
+              </a:rPr>
+              <a:t>Earlier we have seen how easily we can create a function with the arrow syntax now it’s time to look upon some limitations also because they will not work similarly to normal functions in several situations.</a:t>
+            </a:r>
+          </a:p>
+          <a:p>
+            <a:pPr algn="just"/>
+            <a:r>
+              <a:rPr lang="en-US" b="1" i="0" dirty="0">
+                <a:effectLst/>
+                <a:latin typeface="sofia-pro"/>
+              </a:rPr>
+              <a:t>No binding of this keyword: </a:t>
+            </a:r>
+            <a:r>
+              <a:rPr lang="en-US" b="0" i="0" dirty="0">
+                <a:effectLst/>
+                <a:latin typeface="sofia-pro"/>
+              </a:rPr>
+              <a:t>It cannot be used as a method because of not having a binding of this keyword. Arrow function contains the lexical </a:t>
+            </a:r>
+            <a:r>
+              <a:rPr lang="en-US" b="0" i="1" dirty="0">
+                <a:effectLst/>
+                <a:latin typeface="sofia-pro"/>
+              </a:rPr>
+              <a:t>this</a:t>
+            </a:r>
+            <a:r>
+              <a:rPr lang="en-US" b="1" i="1" dirty="0">
+                <a:effectLst/>
+                <a:latin typeface="sofia-pro"/>
+              </a:rPr>
+              <a:t> </a:t>
+            </a:r>
+            <a:r>
+              <a:rPr lang="en-US" b="0" i="0" dirty="0">
+                <a:effectLst/>
+                <a:latin typeface="sofia-pro"/>
+              </a:rPr>
+              <a:t>instead of their own. The value of this will be based upon the scope in which they are defined. So the arrow function is defined in the window scope hence this will refer to the window object instead of the object in which the function has been written. There does not exist any property or method with ‘num’ hence undefined will be printed.</a:t>
+            </a:r>
+          </a:p>
+          <a:p>
+            <a:pPr marL="457200" lvl="1" indent="0">
+              <a:buNone/>
+            </a:pPr>
+            <a:r>
+              <a:rPr lang="en-IN" dirty="0"/>
+              <a:t>var </a:t>
+            </a:r>
+            <a:r>
+              <a:rPr lang="en-IN" dirty="0" err="1"/>
+              <a:t>obj</a:t>
+            </a:r>
+            <a:r>
+              <a:rPr lang="en-IN" dirty="0"/>
+              <a:t> = {</a:t>
+            </a:r>
+          </a:p>
+          <a:p>
+            <a:pPr marL="457200" lvl="1" indent="0">
+              <a:buNone/>
+            </a:pPr>
+            <a:r>
+              <a:rPr lang="en-IN" dirty="0"/>
+              <a:t>  </a:t>
+            </a:r>
+            <a:r>
+              <a:rPr lang="en-IN" dirty="0" err="1"/>
+              <a:t>num</a:t>
+            </a:r>
+            <a:r>
+              <a:rPr lang="en-IN" dirty="0"/>
+              <a:t>: 10,</a:t>
+            </a:r>
+          </a:p>
+          <a:p>
+            <a:pPr marL="457200" lvl="1" indent="0">
+              <a:buNone/>
+            </a:pPr>
+            <a:r>
+              <a:rPr lang="en-IN" dirty="0"/>
+              <a:t>  </a:t>
+            </a:r>
+            <a:r>
+              <a:rPr lang="en-IN" dirty="0" err="1"/>
+              <a:t>myFunc</a:t>
+            </a:r>
+            <a:r>
+              <a:rPr lang="en-IN" dirty="0"/>
+              <a:t>: () =&gt; {console.log(</a:t>
+            </a:r>
+            <a:r>
+              <a:rPr lang="en-IN" dirty="0" err="1"/>
+              <a:t>this.num</a:t>
+            </a:r>
+            <a:r>
+              <a:rPr lang="en-IN" dirty="0"/>
+              <a:t>)}</a:t>
+            </a:r>
+          </a:p>
+          <a:p>
+            <a:pPr marL="457200" lvl="1" indent="0">
+              <a:buNone/>
+            </a:pPr>
+            <a:r>
+              <a:rPr lang="en-IN" dirty="0"/>
+              <a:t>} </a:t>
+            </a:r>
+          </a:p>
+          <a:p>
+            <a:pPr marL="457200" lvl="1" indent="0">
+              <a:buNone/>
+            </a:pPr>
+            <a:r>
+              <a:rPr lang="en-IN" dirty="0" err="1"/>
+              <a:t>obj.myFunc</a:t>
+            </a:r>
+            <a:r>
+              <a:rPr lang="en-IN" dirty="0"/>
+              <a:t>();	//undefined</a:t>
+            </a:r>
+          </a:p>
+          <a:p>
+            <a:r>
+              <a:rPr lang="en-US" b="1" i="0" dirty="0">
+                <a:effectLst/>
+                <a:latin typeface="sofia-pro"/>
+              </a:rPr>
+              <a:t>Explanation: </a:t>
+            </a:r>
+            <a:r>
+              <a:rPr lang="en-US" b="0" i="0" dirty="0">
+                <a:effectLst/>
+                <a:latin typeface="sofia-pro"/>
+              </a:rPr>
+              <a:t>The normal function contains </a:t>
+            </a:r>
+            <a:r>
+              <a:rPr lang="en-US" b="0" i="1" dirty="0">
+                <a:effectLst/>
+                <a:latin typeface="sofia-pro"/>
+              </a:rPr>
+              <a:t>this</a:t>
+            </a:r>
+            <a:r>
+              <a:rPr lang="en-US" b="0" i="0" dirty="0">
+                <a:effectLst/>
+                <a:latin typeface="sofia-pro"/>
+              </a:rPr>
+              <a:t> which refers to the object to which it belongs. Hence the function belongs to the </a:t>
+            </a:r>
+            <a:r>
+              <a:rPr lang="en-US" b="0" i="1" dirty="0">
+                <a:effectLst/>
+                <a:latin typeface="sofia-pro"/>
+              </a:rPr>
+              <a:t>obj</a:t>
+            </a:r>
+            <a:r>
+              <a:rPr lang="en-US" b="0" i="0" dirty="0">
+                <a:effectLst/>
+                <a:latin typeface="sofia-pro"/>
+              </a:rPr>
+              <a:t> object and property </a:t>
+            </a:r>
+            <a:r>
+              <a:rPr lang="en-US" b="0" i="1" dirty="0">
+                <a:effectLst/>
+                <a:latin typeface="sofia-pro"/>
+              </a:rPr>
+              <a:t>num </a:t>
+            </a:r>
+            <a:r>
+              <a:rPr lang="en-US" b="0" i="0" dirty="0">
+                <a:effectLst/>
+                <a:latin typeface="sofia-pro"/>
+              </a:rPr>
+              <a:t>exists inside it, so it will be printed successfully. </a:t>
+            </a:r>
+            <a:endParaRPr lang="en-IN" dirty="0"/>
           </a:p>
         </p:txBody>
       </p:sp>
@@ -12816,12 +13650,26 @@
             <p:ph type="title"/>
           </p:nvPr>
         </p:nvSpPr>
-        <p:spPr/>
-        <p:txBody>
-          <a:bodyPr/>
+        <p:spPr>
+          <a:xfrm>
+            <a:off x="1141413" y="618518"/>
+            <a:ext cx="9905998" cy="535579"/>
+          </a:xfrm>
+        </p:spPr>
+        <p:txBody>
+          <a:bodyPr>
+            <a:normAutofit/>
+          </a:bodyPr>
           <a:lstStyle/>
           <a:p>
-            <a:endParaRPr lang="en-IN"/>
+            <a:r>
+              <a:rPr lang="en-US" sz="3200" b="0" i="0" dirty="0">
+                <a:effectLst/>
+                <a:latin typeface="sofia-pro"/>
+              </a:rPr>
+              <a:t>Function declaration and types of functions in JS</a:t>
+            </a:r>
+            <a:endParaRPr lang="en-IN" sz="3200" dirty="0"/>
           </a:p>
         </p:txBody>
       </p:sp>
@@ -12841,12 +13689,177 @@
             <p:ph idx="1"/>
           </p:nvPr>
         </p:nvSpPr>
-        <p:spPr/>
-        <p:txBody>
-          <a:bodyPr/>
+        <p:spPr>
+          <a:xfrm>
+            <a:off x="1141412" y="1340528"/>
+            <a:ext cx="9905999" cy="5113538"/>
+          </a:xfrm>
+        </p:spPr>
+        <p:txBody>
+          <a:bodyPr>
+            <a:normAutofit fontScale="55000" lnSpcReduction="20000"/>
+          </a:bodyPr>
           <a:lstStyle/>
           <a:p>
-            <a:endParaRPr lang="en-IN"/>
+            <a:r>
+              <a:rPr lang="en-US" dirty="0"/>
+              <a:t>A function is basically a user-defined structure of code which we can use any number of types by just calling its entity.</a:t>
+            </a:r>
+          </a:p>
+          <a:p>
+            <a:r>
+              <a:rPr lang="en-US" dirty="0"/>
+              <a:t>We can give any name to our defined functions and also pass any number of parameters to the function, even a non-</a:t>
+            </a:r>
+            <a:r>
+              <a:rPr lang="en-US" dirty="0" err="1"/>
+              <a:t>parameterised</a:t>
+            </a:r>
+            <a:r>
+              <a:rPr lang="en-US" dirty="0"/>
+              <a:t> function can also be valid.</a:t>
+            </a:r>
+          </a:p>
+          <a:p>
+            <a:r>
+              <a:rPr lang="en-US" dirty="0"/>
+              <a:t>Let us see the syntax of the Function declaration in JS:</a:t>
+            </a:r>
+          </a:p>
+          <a:p>
+            <a:pPr marL="457200" lvl="1" indent="0">
+              <a:buNone/>
+            </a:pPr>
+            <a:r>
+              <a:rPr lang="en-US" dirty="0"/>
+              <a:t>function </a:t>
+            </a:r>
+            <a:r>
+              <a:rPr lang="en-US" dirty="0" err="1"/>
+              <a:t>FunctionName</a:t>
+            </a:r>
+            <a:r>
+              <a:rPr lang="en-US" dirty="0"/>
+              <a:t>(){</a:t>
+            </a:r>
+          </a:p>
+          <a:p>
+            <a:pPr marL="457200" lvl="1" indent="0">
+              <a:buNone/>
+            </a:pPr>
+            <a:r>
+              <a:rPr lang="en-US" dirty="0"/>
+              <a:t>//body</a:t>
+            </a:r>
+          </a:p>
+          <a:p>
+            <a:pPr marL="457200" lvl="1" indent="0">
+              <a:buNone/>
+            </a:pPr>
+            <a:r>
+              <a:rPr lang="en-US" dirty="0"/>
+              <a:t>}</a:t>
+            </a:r>
+          </a:p>
+          <a:p>
+            <a:r>
+              <a:rPr lang="en-US" dirty="0"/>
+              <a:t>In this defined function, we can observe the basic syntax of the function like the name of the function is </a:t>
+            </a:r>
+            <a:r>
+              <a:rPr lang="en-US" dirty="0" err="1"/>
+              <a:t>FunctionName</a:t>
+            </a:r>
+            <a:r>
+              <a:rPr lang="en-US" dirty="0"/>
+              <a:t> and in the parentheses after the name would be used to take the parameters in the function.</a:t>
+            </a:r>
+          </a:p>
+          <a:p>
+            <a:r>
+              <a:rPr lang="en-US" dirty="0"/>
+              <a:t>The parameters are the values which is passed to the function which can be used to take values to the functions, and the arguments are the values which can be used to pass the values to function from the calling part of the function.</a:t>
+            </a:r>
+          </a:p>
+          <a:p>
+            <a:r>
+              <a:rPr lang="en-US" dirty="0"/>
+              <a:t>Syntax of the Function Declaration using the parameters:</a:t>
+            </a:r>
+          </a:p>
+          <a:p>
+            <a:pPr marL="457200" lvl="1" indent="0">
+              <a:buNone/>
+            </a:pPr>
+            <a:r>
+              <a:rPr lang="en-US" dirty="0"/>
+              <a:t>function </a:t>
+            </a:r>
+            <a:r>
+              <a:rPr lang="en-US" dirty="0" err="1"/>
+              <a:t>FunctionName</a:t>
+            </a:r>
+            <a:r>
+              <a:rPr lang="en-US" dirty="0"/>
+              <a:t>(Name){</a:t>
+            </a:r>
+          </a:p>
+          <a:p>
+            <a:pPr marL="457200" lvl="1" indent="0">
+              <a:buNone/>
+            </a:pPr>
+            <a:r>
+              <a:rPr lang="en-US" dirty="0"/>
+              <a:t>//body</a:t>
+            </a:r>
+          </a:p>
+          <a:p>
+            <a:pPr marL="457200" lvl="1" indent="0">
+              <a:buNone/>
+            </a:pPr>
+            <a:r>
+              <a:rPr lang="en-US" dirty="0"/>
+              <a:t>}</a:t>
+            </a:r>
+          </a:p>
+          <a:p>
+            <a:r>
+              <a:rPr lang="en-US" dirty="0"/>
+              <a:t>This is the given function which would be used to take the parameters of the key Name.</a:t>
+            </a:r>
+          </a:p>
+          <a:p>
+            <a:r>
+              <a:rPr lang="en-US" dirty="0"/>
+              <a:t>The following calling may be used to call the </a:t>
+            </a:r>
+            <a:r>
+              <a:rPr lang="en-US" dirty="0" err="1"/>
+              <a:t>parameterised</a:t>
+            </a:r>
+            <a:r>
+              <a:rPr lang="en-US" dirty="0"/>
+              <a:t> function:</a:t>
+            </a:r>
+          </a:p>
+          <a:p>
+            <a:r>
+              <a:rPr lang="en-US" dirty="0" err="1"/>
+              <a:t>FunctionName</a:t>
+            </a:r>
+            <a:r>
+              <a:rPr lang="en-US" dirty="0"/>
+              <a:t>(“</a:t>
+            </a:r>
+            <a:r>
+              <a:rPr lang="en-US" dirty="0" err="1"/>
+              <a:t>GeeksForGeeks</a:t>
+            </a:r>
+            <a:r>
+              <a:rPr lang="en-US" dirty="0"/>
+              <a:t>”);</a:t>
+            </a:r>
+            <a:endParaRPr lang="en-IN" dirty="0"/>
           </a:p>
         </p:txBody>
       </p:sp>
@@ -12896,12 +13909,26 @@
             <p:ph type="title"/>
           </p:nvPr>
         </p:nvSpPr>
-        <p:spPr/>
-        <p:txBody>
-          <a:bodyPr/>
+        <p:spPr>
+          <a:xfrm>
+            <a:off x="1141413" y="618518"/>
+            <a:ext cx="9905998" cy="448281"/>
+          </a:xfrm>
+        </p:spPr>
+        <p:txBody>
+          <a:bodyPr>
+            <a:normAutofit fontScale="90000"/>
+          </a:bodyPr>
           <a:lstStyle/>
           <a:p>
-            <a:endParaRPr lang="en-IN"/>
+            <a:r>
+              <a:rPr lang="en-US" sz="3200" b="0" i="0" dirty="0">
+                <a:effectLst/>
+                <a:latin typeface="sofia-pro"/>
+              </a:rPr>
+              <a:t>Function declaration and types of functions in JS</a:t>
+            </a:r>
+            <a:endParaRPr lang="en-IN" sz="3200" dirty="0"/>
           </a:p>
         </p:txBody>
       </p:sp>
@@ -12921,12 +13948,207 @@
             <p:ph idx="1"/>
           </p:nvPr>
         </p:nvSpPr>
-        <p:spPr/>
-        <p:txBody>
-          <a:bodyPr/>
+        <p:spPr>
+          <a:xfrm>
+            <a:off x="1141412" y="1198484"/>
+            <a:ext cx="9905999" cy="5040997"/>
+          </a:xfrm>
+        </p:spPr>
+        <p:txBody>
+          <a:bodyPr>
+            <a:normAutofit fontScale="47500" lnSpcReduction="20000"/>
+          </a:bodyPr>
           <a:lstStyle/>
           <a:p>
-            <a:endParaRPr lang="en-IN"/>
+            <a:pPr marL="0" indent="0">
+              <a:buNone/>
+            </a:pPr>
+            <a:r>
+              <a:rPr lang="en-US" dirty="0"/>
+              <a:t>Example Code:</a:t>
+            </a:r>
+          </a:p>
+          <a:p>
+            <a:pPr marL="457200" lvl="1" indent="0">
+              <a:buNone/>
+            </a:pPr>
+            <a:r>
+              <a:rPr lang="en-US" dirty="0"/>
+              <a:t>function Print(name){</a:t>
+            </a:r>
+          </a:p>
+          <a:p>
+            <a:pPr marL="457200" lvl="1" indent="0">
+              <a:buNone/>
+            </a:pPr>
+            <a:r>
+              <a:rPr lang="en-US" dirty="0"/>
+              <a:t>console.log(${name});</a:t>
+            </a:r>
+          </a:p>
+          <a:p>
+            <a:pPr marL="457200" lvl="1" indent="0">
+              <a:buNone/>
+            </a:pPr>
+            <a:r>
+              <a:rPr lang="en-US" dirty="0"/>
+              <a:t>}</a:t>
+            </a:r>
+          </a:p>
+          <a:p>
+            <a:pPr marL="457200" lvl="1" indent="0">
+              <a:buNone/>
+            </a:pPr>
+            <a:r>
+              <a:rPr lang="en-US" dirty="0"/>
+              <a:t>Print(“</a:t>
+            </a:r>
+            <a:r>
+              <a:rPr lang="en-US" dirty="0" err="1"/>
+              <a:t>GeeksForGeeks</a:t>
+            </a:r>
+            <a:r>
+              <a:rPr lang="en-US" dirty="0"/>
+              <a:t>”);</a:t>
+            </a:r>
+          </a:p>
+          <a:p>
+            <a:pPr marL="457200" lvl="1" indent="0">
+              <a:buNone/>
+            </a:pPr>
+            <a:r>
+              <a:rPr lang="en-US" dirty="0"/>
+              <a:t>Print(“Anupam Gupta”);</a:t>
+            </a:r>
+          </a:p>
+          <a:p>
+            <a:r>
+              <a:rPr lang="en-US" dirty="0"/>
+              <a:t>Output:</a:t>
+            </a:r>
+          </a:p>
+          <a:p>
+            <a:pPr marL="457200" lvl="1" indent="0">
+              <a:buNone/>
+            </a:pPr>
+            <a:r>
+              <a:rPr lang="en-US" dirty="0" err="1"/>
+              <a:t>GeeksForGeeks</a:t>
+            </a:r>
+            <a:endParaRPr lang="en-US" dirty="0"/>
+          </a:p>
+          <a:p>
+            <a:pPr marL="457200" lvl="1" indent="0">
+              <a:buNone/>
+            </a:pPr>
+            <a:r>
+              <a:rPr lang="en-US" dirty="0"/>
+              <a:t>Anupam Gupta</a:t>
+            </a:r>
+          </a:p>
+          <a:p>
+            <a:r>
+              <a:rPr lang="en-US" dirty="0"/>
+              <a:t>The Function set of JS also contains a type of functions as:</a:t>
+            </a:r>
+          </a:p>
+          <a:p>
+            <a:r>
+              <a:rPr lang="en-US" b="1" dirty="0"/>
+              <a:t>Anonymous Functions:</a:t>
+            </a:r>
+          </a:p>
+          <a:p>
+            <a:r>
+              <a:rPr lang="en-US" dirty="0"/>
+              <a:t>The anonymous functions are basically the functions which can be passed to a variable without having its own identity.</a:t>
+            </a:r>
+          </a:p>
+          <a:p>
+            <a:r>
+              <a:rPr lang="en-US" dirty="0"/>
+              <a:t>Syntax:</a:t>
+            </a:r>
+          </a:p>
+          <a:p>
+            <a:pPr marL="457200" lvl="1" indent="0">
+              <a:buNone/>
+            </a:pPr>
+            <a:r>
+              <a:rPr lang="en-US" dirty="0"/>
+              <a:t>let </a:t>
+            </a:r>
+            <a:r>
+              <a:rPr lang="en-US" dirty="0" err="1"/>
+              <a:t>AnonymousFunction</a:t>
+            </a:r>
+            <a:r>
+              <a:rPr lang="en-US" dirty="0"/>
+              <a:t> = Function(){</a:t>
+            </a:r>
+          </a:p>
+          <a:p>
+            <a:pPr marL="457200" lvl="1" indent="0">
+              <a:buNone/>
+            </a:pPr>
+            <a:r>
+              <a:rPr lang="en-US" dirty="0"/>
+              <a:t>//Body</a:t>
+            </a:r>
+          </a:p>
+          <a:p>
+            <a:pPr marL="457200" lvl="1" indent="0">
+              <a:buNone/>
+            </a:pPr>
+            <a:r>
+              <a:rPr lang="en-US" dirty="0"/>
+              <a:t>}</a:t>
+            </a:r>
+          </a:p>
+          <a:p>
+            <a:r>
+              <a:rPr lang="en-US" dirty="0"/>
+              <a:t>This </a:t>
+            </a:r>
+            <a:r>
+              <a:rPr lang="en-US" dirty="0" err="1"/>
+              <a:t>AnonymousFunction</a:t>
+            </a:r>
+            <a:r>
+              <a:rPr lang="en-US" dirty="0"/>
+              <a:t> is used to have the properties of the assigned function and it can also be called as the similar function like </a:t>
+            </a:r>
+            <a:r>
+              <a:rPr lang="en-US" dirty="0" err="1"/>
+              <a:t>AnonumousFunction</a:t>
+            </a:r>
+            <a:r>
+              <a:rPr lang="en-US" dirty="0"/>
+              <a:t>().</a:t>
+            </a:r>
+          </a:p>
+          <a:p>
+            <a:r>
+              <a:rPr lang="en-US" dirty="0"/>
+              <a:t>Also, if you trying to check the </a:t>
+            </a:r>
+            <a:r>
+              <a:rPr lang="en-US" dirty="0" err="1"/>
+              <a:t>typeOf</a:t>
+            </a:r>
+            <a:r>
+              <a:rPr lang="en-US" dirty="0"/>
+              <a:t> property of </a:t>
+            </a:r>
+            <a:r>
+              <a:rPr lang="en-US" dirty="0" err="1"/>
+              <a:t>AnnymousFunction</a:t>
+            </a:r>
+            <a:r>
+              <a:rPr lang="en-US" dirty="0"/>
+              <a:t>, then it will show function as the function has been assigned to the variable.</a:t>
+            </a:r>
+            <a:endParaRPr lang="en-IN" dirty="0"/>
           </a:p>
         </p:txBody>
       </p:sp>
@@ -12976,12 +14198,26 @@
             <p:ph type="title"/>
           </p:nvPr>
         </p:nvSpPr>
-        <p:spPr/>
-        <p:txBody>
-          <a:bodyPr/>
+        <p:spPr>
+          <a:xfrm>
+            <a:off x="1141413" y="618518"/>
+            <a:ext cx="9905998" cy="553334"/>
+          </a:xfrm>
+        </p:spPr>
+        <p:txBody>
+          <a:bodyPr>
+            <a:normAutofit/>
+          </a:bodyPr>
           <a:lstStyle/>
           <a:p>
-            <a:endParaRPr lang="en-IN"/>
+            <a:r>
+              <a:rPr lang="en-US" sz="2400" b="0" i="0" dirty="0">
+                <a:effectLst/>
+                <a:latin typeface="sofia-pro"/>
+              </a:rPr>
+              <a:t>Understanding Arrow function, return and undefined in JS</a:t>
+            </a:r>
+            <a:endParaRPr lang="en-IN" sz="2400" dirty="0"/>
           </a:p>
         </p:txBody>
       </p:sp>
@@ -13001,12 +14237,167 @@
             <p:ph idx="1"/>
           </p:nvPr>
         </p:nvSpPr>
-        <p:spPr/>
-        <p:txBody>
-          <a:bodyPr/>
+        <p:spPr>
+          <a:xfrm>
+            <a:off x="1141412" y="1171851"/>
+            <a:ext cx="9905999" cy="5067631"/>
+          </a:xfrm>
+        </p:spPr>
+        <p:txBody>
+          <a:bodyPr>
+            <a:normAutofit fontScale="55000" lnSpcReduction="20000"/>
+          </a:bodyPr>
           <a:lstStyle/>
           <a:p>
-            <a:endParaRPr lang="en-IN"/>
+            <a:r>
+              <a:rPr lang="en-US" dirty="0"/>
+              <a:t>A </a:t>
+            </a:r>
+            <a:r>
+              <a:rPr lang="en-US" dirty="0" err="1"/>
+              <a:t>javascript</a:t>
+            </a:r>
+            <a:r>
+              <a:rPr lang="en-US" dirty="0"/>
+              <a:t> function can take the parameters from the arguments through the call, in the same way, a </a:t>
+            </a:r>
+            <a:r>
+              <a:rPr lang="en-US" dirty="0" err="1"/>
+              <a:t>javaScript</a:t>
+            </a:r>
+            <a:r>
+              <a:rPr lang="en-US" dirty="0"/>
+              <a:t> function is allowed to return the computed data to the calling function.</a:t>
+            </a:r>
+          </a:p>
+          <a:p>
+            <a:r>
+              <a:rPr lang="en-US" dirty="0"/>
+              <a:t>Syntax:</a:t>
+            </a:r>
+          </a:p>
+          <a:p>
+            <a:pPr marL="457200" lvl="1" indent="0">
+              <a:buNone/>
+            </a:pPr>
+            <a:r>
+              <a:rPr lang="en-US" dirty="0"/>
+              <a:t>function name(){</a:t>
+            </a:r>
+          </a:p>
+          <a:p>
+            <a:pPr marL="457200" lvl="1" indent="0">
+              <a:buNone/>
+            </a:pPr>
+            <a:r>
+              <a:rPr lang="en-US" dirty="0"/>
+              <a:t>//body</a:t>
+            </a:r>
+          </a:p>
+          <a:p>
+            <a:pPr marL="457200" lvl="1" indent="0">
+              <a:buNone/>
+            </a:pPr>
+            <a:r>
+              <a:rPr lang="en-US" dirty="0"/>
+              <a:t>Return “some data”;</a:t>
+            </a:r>
+          </a:p>
+          <a:p>
+            <a:pPr marL="457200" lvl="1" indent="0">
+              <a:buNone/>
+            </a:pPr>
+            <a:r>
+              <a:rPr lang="en-US" dirty="0"/>
+              <a:t>}</a:t>
+            </a:r>
+          </a:p>
+          <a:p>
+            <a:r>
+              <a:rPr lang="en-US" dirty="0"/>
+              <a:t>The data which we are returning from the function will be </a:t>
+            </a:r>
+            <a:r>
+              <a:rPr lang="en-US" dirty="0" err="1"/>
+              <a:t>catched</a:t>
+            </a:r>
+            <a:r>
+              <a:rPr lang="en-US" dirty="0"/>
+              <a:t> to the calling function in the given following way:</a:t>
+            </a:r>
+          </a:p>
+          <a:p>
+            <a:pPr marL="457200" lvl="1" indent="0">
+              <a:buNone/>
+            </a:pPr>
+            <a:r>
+              <a:rPr lang="en-US" dirty="0"/>
+              <a:t>     Const data = name();</a:t>
+            </a:r>
+          </a:p>
+          <a:p>
+            <a:r>
+              <a:rPr lang="en-US" dirty="0"/>
+              <a:t>The data variable will be storing the data which we are passing through the return statement of the function.</a:t>
+            </a:r>
+          </a:p>
+          <a:p>
+            <a:r>
+              <a:rPr lang="en-US" dirty="0"/>
+              <a:t>Example:</a:t>
+            </a:r>
+          </a:p>
+          <a:p>
+            <a:pPr marL="457200" lvl="1" indent="0">
+              <a:buNone/>
+            </a:pPr>
+            <a:r>
+              <a:rPr lang="en-US" dirty="0"/>
+              <a:t>function sample(){</a:t>
+            </a:r>
+          </a:p>
+          <a:p>
+            <a:pPr marL="457200" lvl="1" indent="0">
+              <a:buNone/>
+            </a:pPr>
+            <a:r>
+              <a:rPr lang="en-US" dirty="0"/>
+              <a:t>	return 3+2;</a:t>
+            </a:r>
+          </a:p>
+          <a:p>
+            <a:pPr marL="457200" lvl="1" indent="0">
+              <a:buNone/>
+            </a:pPr>
+            <a:r>
+              <a:rPr lang="en-US" dirty="0"/>
+              <a:t>}</a:t>
+            </a:r>
+          </a:p>
+          <a:p>
+            <a:pPr marL="457200" lvl="1" indent="0">
+              <a:buNone/>
+            </a:pPr>
+            <a:r>
+              <a:rPr lang="en-US" dirty="0"/>
+              <a:t>Var data = sample();</a:t>
+            </a:r>
+          </a:p>
+          <a:p>
+            <a:pPr marL="457200" lvl="1" indent="0">
+              <a:buNone/>
+            </a:pPr>
+            <a:r>
+              <a:rPr lang="en-US" dirty="0"/>
+              <a:t>console.log(data);	//5</a:t>
+            </a:r>
+          </a:p>
+          <a:p>
+            <a:r>
+              <a:rPr lang="en-US" dirty="0"/>
+              <a:t>The undefined is the non-value in which the defined variable is not defined that which type of variable it is and it is not included with any type of the value.</a:t>
+            </a:r>
+            <a:endParaRPr lang="en-IN" dirty="0"/>
           </a:p>
         </p:txBody>
       </p:sp>
@@ -13056,12 +14447,26 @@
             <p:ph type="title"/>
           </p:nvPr>
         </p:nvSpPr>
-        <p:spPr/>
-        <p:txBody>
-          <a:bodyPr/>
+        <p:spPr>
+          <a:xfrm>
+            <a:off x="1141413" y="618518"/>
+            <a:ext cx="9905998" cy="588845"/>
+          </a:xfrm>
+        </p:spPr>
+        <p:txBody>
+          <a:bodyPr>
+            <a:normAutofit/>
+          </a:bodyPr>
           <a:lstStyle/>
           <a:p>
-            <a:endParaRPr lang="en-IN"/>
+            <a:r>
+              <a:rPr lang="en-US" sz="2400" b="0" i="0" dirty="0">
+                <a:effectLst/>
+                <a:latin typeface="sofia-pro"/>
+              </a:rPr>
+              <a:t>Understanding Arrow function, return and undefined in JS</a:t>
+            </a:r>
+            <a:endParaRPr lang="en-IN" sz="2400" dirty="0"/>
           </a:p>
         </p:txBody>
       </p:sp>
@@ -13081,12 +14486,132 @@
             <p:ph idx="1"/>
           </p:nvPr>
         </p:nvSpPr>
-        <p:spPr/>
-        <p:txBody>
-          <a:bodyPr/>
+        <p:spPr>
+          <a:xfrm>
+            <a:off x="1141412" y="1207363"/>
+            <a:ext cx="9905999" cy="4856086"/>
+          </a:xfrm>
+        </p:spPr>
+        <p:txBody>
+          <a:bodyPr>
+            <a:normAutofit fontScale="55000" lnSpcReduction="20000"/>
+          </a:bodyPr>
           <a:lstStyle/>
           <a:p>
-            <a:endParaRPr lang="en-IN"/>
+            <a:r>
+              <a:rPr lang="en-US" dirty="0"/>
+              <a:t>Arrow Function:</a:t>
+            </a:r>
+          </a:p>
+          <a:p>
+            <a:r>
+              <a:rPr lang="en-US" dirty="0"/>
+              <a:t>Arrow functions are newly introduced in ES6 which can be used just as the replacement of the normal functions.</a:t>
+            </a:r>
+          </a:p>
+          <a:p>
+            <a:r>
+              <a:rPr lang="en-US" dirty="0"/>
+              <a:t>Syntax:</a:t>
+            </a:r>
+          </a:p>
+          <a:p>
+            <a:pPr marL="457200" lvl="1" indent="0">
+              <a:buNone/>
+            </a:pPr>
+            <a:r>
+              <a:rPr lang="en-US" dirty="0"/>
+              <a:t>Const sample = () =&gt;{</a:t>
+            </a:r>
+          </a:p>
+          <a:p>
+            <a:pPr marL="457200" lvl="1" indent="0">
+              <a:buNone/>
+            </a:pPr>
+            <a:r>
+              <a:rPr lang="en-US" dirty="0"/>
+              <a:t>//body };</a:t>
+            </a:r>
+          </a:p>
+          <a:p>
+            <a:r>
+              <a:rPr lang="en-US" dirty="0"/>
+              <a:t>This is a type of function in which the function named is sample and the parameters can be passed in the parentheses after the equal sign.</a:t>
+            </a:r>
+          </a:p>
+          <a:p>
+            <a:r>
+              <a:rPr lang="en-US" dirty="0"/>
+              <a:t>This function can be called as the same as we were calling the previous functions </a:t>
+            </a:r>
+          </a:p>
+          <a:p>
+            <a:r>
+              <a:rPr lang="en-US" dirty="0"/>
+              <a:t>// sample();</a:t>
+            </a:r>
+          </a:p>
+          <a:p>
+            <a:r>
+              <a:rPr lang="en-US" dirty="0"/>
+              <a:t>In this function if we just define a one line or inline function then there is no need of calling the return statement, but it can automatically pass the values back to the calling function.</a:t>
+            </a:r>
+          </a:p>
+          <a:p>
+            <a:r>
+              <a:rPr lang="en-US" dirty="0"/>
+              <a:t>Example code:</a:t>
+            </a:r>
+          </a:p>
+          <a:p>
+            <a:pPr marL="457200" lvl="1" indent="0">
+              <a:buNone/>
+            </a:pPr>
+            <a:r>
+              <a:rPr lang="en-US" dirty="0"/>
+              <a:t>Const sample = (</a:t>
+            </a:r>
+            <a:r>
+              <a:rPr lang="en-US" dirty="0" err="1"/>
+              <a:t>x,y</a:t>
+            </a:r>
+            <a:r>
+              <a:rPr lang="en-US" dirty="0"/>
+              <a:t>) =&gt; </a:t>
+            </a:r>
+            <a:r>
+              <a:rPr lang="en-US" dirty="0" err="1"/>
+              <a:t>x+y</a:t>
+            </a:r>
+            <a:r>
+              <a:rPr lang="en-US" dirty="0"/>
+              <a:t>;</a:t>
+            </a:r>
+          </a:p>
+          <a:p>
+            <a:pPr marL="457200" lvl="1" indent="0">
+              <a:buNone/>
+            </a:pPr>
+            <a:r>
+              <a:rPr lang="en-US" dirty="0"/>
+              <a:t>Const output = sample(12,13);</a:t>
+            </a:r>
+          </a:p>
+          <a:p>
+            <a:pPr marL="457200" lvl="1" indent="0">
+              <a:buNone/>
+            </a:pPr>
+            <a:r>
+              <a:rPr lang="en-US" dirty="0"/>
+              <a:t>console.log(output);	//25</a:t>
+            </a:r>
+          </a:p>
+          <a:p>
+            <a:r>
+              <a:rPr lang="en-US" dirty="0"/>
+              <a:t>As you can see the arrow function sample is just passed a parameters and its still returned the correct value without using the return statement, so this is one of the benefit of using arrow functions.</a:t>
+            </a:r>
+            <a:endParaRPr lang="en-IN" dirty="0"/>
           </a:p>
         </p:txBody>
       </p:sp>
@@ -17199,12 +18724,26 @@
             <p:ph type="title"/>
           </p:nvPr>
         </p:nvSpPr>
-        <p:spPr/>
-        <p:txBody>
-          <a:bodyPr/>
+        <p:spPr>
+          <a:xfrm>
+            <a:off x="1141413" y="618518"/>
+            <a:ext cx="9905998" cy="514957"/>
+          </a:xfrm>
+        </p:spPr>
+        <p:txBody>
+          <a:bodyPr>
+            <a:normAutofit fontScale="90000"/>
+          </a:bodyPr>
           <a:lstStyle/>
           <a:p>
-            <a:endParaRPr lang="en-IN"/>
+            <a:r>
+              <a:rPr lang="en-US" b="0" i="0" dirty="0">
+                <a:effectLst/>
+                <a:latin typeface="sofia-pro"/>
+              </a:rPr>
+              <a:t>Arrow Function</a:t>
+            </a:r>
+            <a:endParaRPr lang="en-IN" dirty="0"/>
           </a:p>
         </p:txBody>
       </p:sp>
@@ -17224,12 +18763,221 @@
             <p:ph idx="1"/>
           </p:nvPr>
         </p:nvSpPr>
-        <p:spPr/>
-        <p:txBody>
-          <a:bodyPr/>
+        <p:spPr>
+          <a:xfrm>
+            <a:off x="1141412" y="1352549"/>
+            <a:ext cx="9905999" cy="5267325"/>
+          </a:xfrm>
+        </p:spPr>
+        <p:txBody>
+          <a:bodyPr>
+            <a:normAutofit fontScale="62500" lnSpcReduction="20000"/>
+          </a:bodyPr>
           <a:lstStyle/>
           <a:p>
-            <a:endParaRPr lang="en-IN"/>
+            <a:pPr algn="just"/>
+            <a:r>
+              <a:rPr lang="en-US" b="0" i="0" dirty="0" err="1">
+                <a:effectLst/>
+                <a:latin typeface="sofia-pro"/>
+              </a:rPr>
+              <a:t>HFunction</a:t>
+            </a:r>
+            <a:r>
+              <a:rPr lang="en-US" b="0" i="0" dirty="0">
+                <a:effectLst/>
+                <a:latin typeface="sofia-pro"/>
+              </a:rPr>
+              <a:t> in any programming language is the basic building block to create and combine the related bits of code. Every programming language provides certain kinds of practices to write any function. The arrow function syntax is one of the most used and efficient ones to create a function in JavaScript.</a:t>
+            </a:r>
+          </a:p>
+          <a:p>
+            <a:pPr algn="just"/>
+            <a:r>
+              <a:rPr lang="en-US" b="1" i="0" dirty="0">
+                <a:effectLst/>
+                <a:latin typeface="sofia-pro"/>
+              </a:rPr>
+              <a:t>How to create arrow function: </a:t>
+            </a:r>
+            <a:r>
+              <a:rPr lang="en-US" b="0" i="0" dirty="0">
+                <a:effectLst/>
+                <a:latin typeface="sofia-pro"/>
+              </a:rPr>
+              <a:t>To write the arrow function, simply create any variable it can be const, let, or var but always do prefer with const to avoid unnecessary problems. And then assign the function code to the variable it. So from now, you can call that function by writing the parenthesis in front of that variable! With arrow function syntax, we consider function as an object and assign the definition to some variable. Following are the syntax of the arrow function:</a:t>
+            </a:r>
+          </a:p>
+          <a:p>
+            <a:pPr lvl="1" algn="just"/>
+            <a:r>
+              <a:rPr lang="en-US" b="0" i="0" dirty="0">
+                <a:effectLst/>
+                <a:latin typeface="sofia-pro"/>
+              </a:rPr>
+              <a:t>const </a:t>
+            </a:r>
+            <a:r>
+              <a:rPr lang="en-US" b="0" i="0" dirty="0" err="1">
+                <a:effectLst/>
+                <a:latin typeface="sofia-pro"/>
+              </a:rPr>
+              <a:t>myFunction</a:t>
+            </a:r>
+            <a:r>
+              <a:rPr lang="en-US" b="0" i="0" dirty="0">
+                <a:effectLst/>
+                <a:latin typeface="sofia-pro"/>
+              </a:rPr>
+              <a:t> = (param1, param2,   .... </a:t>
+            </a:r>
+            <a:r>
+              <a:rPr lang="en-US" b="0" i="0" dirty="0" err="1">
+                <a:effectLst/>
+                <a:latin typeface="sofia-pro"/>
+              </a:rPr>
+              <a:t>paramN</a:t>
+            </a:r>
+            <a:r>
+              <a:rPr lang="en-US" b="0" i="0" dirty="0">
+                <a:effectLst/>
+                <a:latin typeface="sofia-pro"/>
+              </a:rPr>
+              <a:t>) =&gt; { // function code }</a:t>
+            </a:r>
+          </a:p>
+          <a:p>
+            <a:pPr lvl="1" algn="just"/>
+            <a:r>
+              <a:rPr lang="en-US" b="0" i="0" dirty="0">
+                <a:effectLst/>
+                <a:latin typeface="sofia-pro"/>
+              </a:rPr>
+              <a:t>const </a:t>
+            </a:r>
+            <a:r>
+              <a:rPr lang="en-US" b="0" i="0" dirty="0" err="1">
+                <a:effectLst/>
+                <a:latin typeface="sofia-pro"/>
+              </a:rPr>
+              <a:t>myFunction</a:t>
+            </a:r>
+            <a:r>
+              <a:rPr lang="en-US" b="0" i="0" dirty="0">
+                <a:effectLst/>
+                <a:latin typeface="sofia-pro"/>
+              </a:rPr>
+              <a:t> = (param) =&gt; { // function code }</a:t>
+            </a:r>
+          </a:p>
+          <a:p>
+            <a:pPr marL="457200" lvl="1" indent="0" algn="just">
+              <a:buNone/>
+            </a:pPr>
+            <a:r>
+              <a:rPr lang="en-US" b="0" i="0" dirty="0">
+                <a:effectLst/>
+                <a:latin typeface="sofia-pro"/>
+              </a:rPr>
+              <a:t>                      or </a:t>
+            </a:r>
+          </a:p>
+          <a:p>
+            <a:pPr lvl="1" algn="just"/>
+            <a:r>
+              <a:rPr lang="en-US" b="0" i="0" dirty="0">
+                <a:effectLst/>
+                <a:latin typeface="sofia-pro"/>
+              </a:rPr>
+              <a:t>const </a:t>
+            </a:r>
+            <a:r>
+              <a:rPr lang="en-US" b="0" i="0" dirty="0" err="1">
+                <a:effectLst/>
+                <a:latin typeface="sofia-pro"/>
+              </a:rPr>
+              <a:t>myFunction</a:t>
+            </a:r>
+            <a:r>
+              <a:rPr lang="en-US" b="0" i="0" dirty="0">
+                <a:effectLst/>
+                <a:latin typeface="sofia-pro"/>
+              </a:rPr>
+              <a:t> = param =&gt; { // function code }  </a:t>
+            </a:r>
+          </a:p>
+          <a:p>
+            <a:pPr lvl="1" algn="just"/>
+            <a:r>
+              <a:rPr lang="en-US" b="0" i="0" dirty="0">
+                <a:effectLst/>
+                <a:latin typeface="sofia-pro"/>
+              </a:rPr>
+              <a:t>const </a:t>
+            </a:r>
+            <a:r>
+              <a:rPr lang="en-US" b="0" i="0" dirty="0" err="1">
+                <a:effectLst/>
+                <a:latin typeface="sofia-pro"/>
+              </a:rPr>
+              <a:t>myFunction</a:t>
+            </a:r>
+            <a:r>
+              <a:rPr lang="en-US" b="0" i="0" dirty="0">
+                <a:effectLst/>
+                <a:latin typeface="sofia-pro"/>
+              </a:rPr>
+              <a:t> = param =&gt; { return param*param }</a:t>
+            </a:r>
+          </a:p>
+          <a:p>
+            <a:pPr marL="457200" lvl="1" indent="0" algn="just">
+              <a:buNone/>
+            </a:pPr>
+            <a:r>
+              <a:rPr lang="en-US" b="0" i="0" dirty="0">
+                <a:effectLst/>
+                <a:latin typeface="sofia-pro"/>
+              </a:rPr>
+              <a:t>                      or </a:t>
+            </a:r>
+          </a:p>
+          <a:p>
+            <a:pPr lvl="1" algn="just"/>
+            <a:r>
+              <a:rPr lang="en-US" b="0" i="0" dirty="0">
+                <a:effectLst/>
+                <a:latin typeface="sofia-pro"/>
+              </a:rPr>
+              <a:t>const </a:t>
+            </a:r>
+            <a:r>
+              <a:rPr lang="en-US" b="0" i="0" dirty="0" err="1">
+                <a:effectLst/>
+                <a:latin typeface="sofia-pro"/>
+              </a:rPr>
+              <a:t>myFunction</a:t>
+            </a:r>
+            <a:r>
+              <a:rPr lang="en-US" b="0" i="0" dirty="0">
+                <a:effectLst/>
+                <a:latin typeface="sofia-pro"/>
+              </a:rPr>
+              <a:t> = param =&gt; param*param</a:t>
+            </a:r>
+          </a:p>
+          <a:p>
+            <a:pPr algn="just"/>
+            <a:r>
+              <a:rPr lang="en-US" b="0" i="0" dirty="0">
+                <a:effectLst/>
+                <a:latin typeface="sofia-pro"/>
+              </a:rPr>
+              <a:t>We can omit the {} parenthesis when there is only one statement and the JavaScript considers that statement as return value, also there is no need to write parenthesis () when there is only one parameter. The arrow function cannot contain the line break between the (params) and the arrow =&gt;, Also there should not be any space between the = and &gt; characters.  </a:t>
+            </a:r>
+            <a:endParaRPr lang="en-US" dirty="0">
+              <a:latin typeface="sofia-pro"/>
+            </a:endParaRPr>
           </a:p>
         </p:txBody>
       </p:sp>
@@ -17495,4 +19243,257 @@
     </a:ext>
   </a:extLst>
 </a:theme>
+</file>
+
+<file path=customXml/item1.xml><?xml version="1.0" encoding="utf-8"?>
+<?mso-contentType ?>
+<FormTemplates xmlns="http://schemas.microsoft.com/sharepoint/v3/contenttype/forms">
+  <Display>DocumentLibraryForm</Display>
+  <Edit>DocumentLibraryForm</Edit>
+  <New>DocumentLibraryForm</New>
+</FormTemplates>
+</file>
+
+<file path=customXml/item2.xml><?xml version="1.0" encoding="utf-8"?>
+<ct:contentTypeSchema xmlns:ct="http://schemas.microsoft.com/office/2006/metadata/contentType" xmlns:ma="http://schemas.microsoft.com/office/2006/metadata/properties/metaAttributes" ct:_="" ma:_="" ma:contentTypeName="Document" ma:contentTypeID="0x01010025EC667E64F3664AA9FF84395B73BBB2" ma:contentTypeVersion="12" ma:contentTypeDescription="Create a new document." ma:contentTypeScope="" ma:versionID="6b12c4ceb98f90cef75c2b4a7241f9ea">
+  <xsd:schema xmlns:xsd="http://www.w3.org/2001/XMLSchema" xmlns:xs="http://www.w3.org/2001/XMLSchema" xmlns:p="http://schemas.microsoft.com/office/2006/metadata/properties" xmlns:ns2="11dab2fc-a00f-488b-a519-3911044eea4e" xmlns:ns3="202a9836-ee93-41fb-ba3c-167105785a0d" targetNamespace="http://schemas.microsoft.com/office/2006/metadata/properties" ma:root="true" ma:fieldsID="c1df371a784d1a7c3bc1d50e69810467" ns2:_="" ns3:_="">
+    <xsd:import namespace="11dab2fc-a00f-488b-a519-3911044eea4e"/>
+    <xsd:import namespace="202a9836-ee93-41fb-ba3c-167105785a0d"/>
+    <xsd:element name="properties">
+      <xsd:complexType>
+        <xsd:sequence>
+          <xsd:element name="documentManagement">
+            <xsd:complexType>
+              <xsd:all>
+                <xsd:element ref="ns2:MediaServiceMetadata" minOccurs="0"/>
+                <xsd:element ref="ns2:MediaServiceFastMetadata" minOccurs="0"/>
+                <xsd:element ref="ns2:lcf76f155ced4ddcb4097134ff3c332f" minOccurs="0"/>
+                <xsd:element ref="ns3:TaxCatchAll" minOccurs="0"/>
+                <xsd:element ref="ns2:MediaServiceDateTaken" minOccurs="0"/>
+                <xsd:element ref="ns2:MediaServiceOCR" minOccurs="0"/>
+                <xsd:element ref="ns2:MediaServiceGenerationTime" minOccurs="0"/>
+                <xsd:element ref="ns2:MediaServiceEventHashCode" minOccurs="0"/>
+                <xsd:element ref="ns3:SharedWithUsers" minOccurs="0"/>
+                <xsd:element ref="ns3:SharedWithDetails" minOccurs="0"/>
+                <xsd:element ref="ns2:MediaLengthInSeconds" minOccurs="0"/>
+              </xsd:all>
+            </xsd:complexType>
+          </xsd:element>
+        </xsd:sequence>
+      </xsd:complexType>
+    </xsd:element>
+  </xsd:schema>
+  <xsd:schema xmlns:xsd="http://www.w3.org/2001/XMLSchema" xmlns:xs="http://www.w3.org/2001/XMLSchema" xmlns:dms="http://schemas.microsoft.com/office/2006/documentManagement/types" xmlns:pc="http://schemas.microsoft.com/office/infopath/2007/PartnerControls" targetNamespace="11dab2fc-a00f-488b-a519-3911044eea4e" elementFormDefault="qualified">
+    <xsd:import namespace="http://schemas.microsoft.com/office/2006/documentManagement/types"/>
+    <xsd:import namespace="http://schemas.microsoft.com/office/infopath/2007/PartnerControls"/>
+    <xsd:element name="MediaServiceMetadata" ma:index="8" nillable="true" ma:displayName="MediaServiceMetadata" ma:hidden="true" ma:internalName="MediaServiceMetadata" ma:readOnly="true">
+      <xsd:simpleType>
+        <xsd:restriction base="dms:Note"/>
+      </xsd:simpleType>
+    </xsd:element>
+    <xsd:element name="MediaServiceFastMetadata" ma:index="9" nillable="true" ma:displayName="MediaServiceFastMetadata" ma:hidden="true" ma:internalName="MediaServiceFastMetadata" ma:readOnly="true">
+      <xsd:simpleType>
+        <xsd:restriction base="dms:Note"/>
+      </xsd:simpleType>
+    </xsd:element>
+    <xsd:element name="lcf76f155ced4ddcb4097134ff3c332f" ma:index="11" nillable="true" ma:taxonomy="true" ma:internalName="lcf76f155ced4ddcb4097134ff3c332f" ma:taxonomyFieldName="MediaServiceImageTags" ma:displayName="Image Tags" ma:readOnly="false" ma:fieldId="{5cf76f15-5ced-4ddc-b409-7134ff3c332f}" ma:taxonomyMulti="true" ma:sspId="6d165d17-9b79-46c3-82b9-c927e733c429" ma:termSetId="09814cd3-568e-fe90-9814-8d621ff8fb84" ma:anchorId="fba54fb3-c3e1-fe81-a776-ca4b69148c4d" ma:open="true" ma:isKeyword="false">
+      <xsd:complexType>
+        <xsd:sequence>
+          <xsd:element ref="pc:Terms" minOccurs="0" maxOccurs="1"/>
+        </xsd:sequence>
+      </xsd:complexType>
+    </xsd:element>
+    <xsd:element name="MediaServiceDateTaken" ma:index="13" nillable="true" ma:displayName="MediaServiceDateTaken" ma:hidden="true" ma:internalName="MediaServiceDateTaken" ma:readOnly="true">
+      <xsd:simpleType>
+        <xsd:restriction base="dms:Text"/>
+      </xsd:simpleType>
+    </xsd:element>
+    <xsd:element name="MediaServiceOCR" ma:index="14" nillable="true" ma:displayName="Extracted Text" ma:internalName="MediaServiceOCR" ma:readOnly="true">
+      <xsd:simpleType>
+        <xsd:restriction base="dms:Note">
+          <xsd:maxLength value="255"/>
+        </xsd:restriction>
+      </xsd:simpleType>
+    </xsd:element>
+    <xsd:element name="MediaServiceGenerationTime" ma:index="15" nillable="true" ma:displayName="MediaServiceGenerationTime" ma:hidden="true" ma:internalName="MediaServiceGenerationTime" ma:readOnly="true">
+      <xsd:simpleType>
+        <xsd:restriction base="dms:Text"/>
+      </xsd:simpleType>
+    </xsd:element>
+    <xsd:element name="MediaServiceEventHashCode" ma:index="16" nillable="true" ma:displayName="MediaServiceEventHashCode" ma:hidden="true" ma:internalName="MediaServiceEventHashCode" ma:readOnly="true">
+      <xsd:simpleType>
+        <xsd:restriction base="dms:Text"/>
+      </xsd:simpleType>
+    </xsd:element>
+    <xsd:element name="MediaLengthInSeconds" ma:index="19" nillable="true" ma:displayName="MediaLengthInSeconds" ma:hidden="true" ma:internalName="MediaLengthInSeconds" ma:readOnly="true">
+      <xsd:simpleType>
+        <xsd:restriction base="dms:Unknown"/>
+      </xsd:simpleType>
+    </xsd:element>
+  </xsd:schema>
+  <xsd:schema xmlns:xsd="http://www.w3.org/2001/XMLSchema" xmlns:xs="http://www.w3.org/2001/XMLSchema" xmlns:dms="http://schemas.microsoft.com/office/2006/documentManagement/types" xmlns:pc="http://schemas.microsoft.com/office/infopath/2007/PartnerControls" targetNamespace="202a9836-ee93-41fb-ba3c-167105785a0d" elementFormDefault="qualified">
+    <xsd:import namespace="http://schemas.microsoft.com/office/2006/documentManagement/types"/>
+    <xsd:import namespace="http://schemas.microsoft.com/office/infopath/2007/PartnerControls"/>
+    <xsd:element name="TaxCatchAll" ma:index="12" nillable="true" ma:displayName="Taxonomy Catch All Column" ma:hidden="true" ma:list="{15756505-aa7f-4bcc-8574-ad9a60508018}" ma:internalName="TaxCatchAll" ma:showField="CatchAllData" ma:web="202a9836-ee93-41fb-ba3c-167105785a0d">
+      <xsd:complexType>
+        <xsd:complexContent>
+          <xsd:extension base="dms:MultiChoiceLookup">
+            <xsd:sequence>
+              <xsd:element name="Value" type="dms:Lookup" maxOccurs="unbounded" minOccurs="0" nillable="true"/>
+            </xsd:sequence>
+          </xsd:extension>
+        </xsd:complexContent>
+      </xsd:complexType>
+    </xsd:element>
+    <xsd:element name="SharedWithUsers" ma:index="17" nillable="true" ma:displayName="Shared With" ma:internalName="SharedWithUsers" ma:readOnly="true">
+      <xsd:complexType>
+        <xsd:complexContent>
+          <xsd:extension base="dms:UserMulti">
+            <xsd:sequence>
+              <xsd:element name="UserInfo" minOccurs="0" maxOccurs="unbounded">
+                <xsd:complexType>
+                  <xsd:sequence>
+                    <xsd:element name="DisplayName" type="xsd:string" minOccurs="0"/>
+                    <xsd:element name="AccountId" type="dms:UserId" minOccurs="0" nillable="true"/>
+                    <xsd:element name="AccountType" type="xsd:string" minOccurs="0"/>
+                  </xsd:sequence>
+                </xsd:complexType>
+              </xsd:element>
+            </xsd:sequence>
+          </xsd:extension>
+        </xsd:complexContent>
+      </xsd:complexType>
+    </xsd:element>
+    <xsd:element name="SharedWithDetails" ma:index="18" nillable="true" ma:displayName="Shared With Details" ma:internalName="SharedWithDetails" ma:readOnly="true">
+      <xsd:simpleType>
+        <xsd:restriction base="dms:Note">
+          <xsd:maxLength value="255"/>
+        </xsd:restriction>
+      </xsd:simpleType>
+    </xsd:element>
+  </xsd:schema>
+  <xsd:schema xmlns="http://schemas.openxmlformats.org/package/2006/metadata/core-properties" xmlns:xsd="http://www.w3.org/2001/XMLSchema" xmlns:xsi="http://www.w3.org/2001/XMLSchema-instance" xmlns:dc="http://purl.org/dc/elements/1.1/" xmlns:dcterms="http://purl.org/dc/terms/" xmlns:odoc="http://schemas.microsoft.com/internal/obd" targetNamespace="http://schemas.openxmlformats.org/package/2006/metadata/core-properties" elementFormDefault="qualified" attributeFormDefault="unqualified" blockDefault="#all">
+    <xsd:import namespace="http://purl.org/dc/elements/1.1/" schemaLocation="http://dublincore.org/schemas/xmls/qdc/2003/04/02/dc.xsd"/>
+    <xsd:import namespace="http://purl.org/dc/terms/" schemaLocation="http://dublincore.org/schemas/xmls/qdc/2003/04/02/dcterms.xsd"/>
+    <xsd:element name="coreProperties" type="CT_coreProperties"/>
+    <xsd:complexType name="CT_coreProperties">
+      <xsd:all>
+        <xsd:element ref="dc:creator" minOccurs="0" maxOccurs="1"/>
+        <xsd:element ref="dcterms:created" minOccurs="0" maxOccurs="1"/>
+        <xsd:element ref="dc:identifier" minOccurs="0" maxOccurs="1"/>
+        <xsd:element name="contentType" minOccurs="0" maxOccurs="1" type="xsd:string" ma:index="0" ma:displayName="Content Type"/>
+        <xsd:element ref="dc:title" minOccurs="0" maxOccurs="1" ma:index="4" ma:displayName="Title"/>
+        <xsd:element ref="dc:subject" minOccurs="0" maxOccurs="1"/>
+        <xsd:element ref="dc:description" minOccurs="0" maxOccurs="1"/>
+        <xsd:element name="keywords" minOccurs="0" maxOccurs="1" type="xsd:string"/>
+        <xsd:element ref="dc:language" minOccurs="0" maxOccurs="1"/>
+        <xsd:element name="category" minOccurs="0" maxOccurs="1" type="xsd:string"/>
+        <xsd:element name="version" minOccurs="0" maxOccurs="1" type="xsd:string"/>
+        <xsd:element name="revision" minOccurs="0" maxOccurs="1" type="xsd:string">
+          <xsd:annotation>
+            <xsd:documentation>
+                        This value indicates the number of saves or revisions. The application is responsible for updating this value after each revision.
+                    </xsd:documentation>
+          </xsd:annotation>
+        </xsd:element>
+        <xsd:element name="lastModifiedBy" minOccurs="0" maxOccurs="1" type="xsd:string"/>
+        <xsd:element ref="dcterms:modified" minOccurs="0" maxOccurs="1"/>
+        <xsd:element name="contentStatus" minOccurs="0" maxOccurs="1" type="xsd:string"/>
+      </xsd:all>
+    </xsd:complexType>
+  </xsd:schema>
+  <xs:schema xmlns:pc="http://schemas.microsoft.com/office/infopath/2007/PartnerControls" xmlns:xs="http://www.w3.org/2001/XMLSchema" targetNamespace="http://schemas.microsoft.com/office/infopath/2007/PartnerControls" elementFormDefault="qualified" attributeFormDefault="unqualified">
+    <xs:element name="Person">
+      <xs:complexType>
+        <xs:sequence>
+          <xs:element ref="pc:DisplayName" minOccurs="0"/>
+          <xs:element ref="pc:AccountId" minOccurs="0"/>
+          <xs:element ref="pc:AccountType" minOccurs="0"/>
+        </xs:sequence>
+      </xs:complexType>
+    </xs:element>
+    <xs:element name="DisplayName" type="xs:string"/>
+    <xs:element name="AccountId" type="xs:string"/>
+    <xs:element name="AccountType" type="xs:string"/>
+    <xs:element name="BDCAssociatedEntity">
+      <xs:complexType>
+        <xs:sequence>
+          <xs:element ref="pc:BDCEntity" minOccurs="0" maxOccurs="unbounded"/>
+        </xs:sequence>
+        <xs:attribute ref="pc:EntityNamespace"/>
+        <xs:attribute ref="pc:EntityName"/>
+        <xs:attribute ref="pc:SystemInstanceName"/>
+        <xs:attribute ref="pc:AssociationName"/>
+      </xs:complexType>
+    </xs:element>
+    <xs:attribute name="EntityNamespace" type="xs:string"/>
+    <xs:attribute name="EntityName" type="xs:string"/>
+    <xs:attribute name="SystemInstanceName" type="xs:string"/>
+    <xs:attribute name="AssociationName" type="xs:string"/>
+    <xs:element name="BDCEntity">
+      <xs:complexType>
+        <xs:sequence>
+          <xs:element ref="pc:EntityDisplayName" minOccurs="0"/>
+          <xs:element ref="pc:EntityInstanceReference" minOccurs="0"/>
+          <xs:element ref="pc:EntityId1" minOccurs="0"/>
+          <xs:element ref="pc:EntityId2" minOccurs="0"/>
+          <xs:element ref="pc:EntityId3" minOccurs="0"/>
+          <xs:element ref="pc:EntityId4" minOccurs="0"/>
+          <xs:element ref="pc:EntityId5" minOccurs="0"/>
+        </xs:sequence>
+      </xs:complexType>
+    </xs:element>
+    <xs:element name="EntityDisplayName" type="xs:string"/>
+    <xs:element name="EntityInstanceReference" type="xs:string"/>
+    <xs:element name="EntityId1" type="xs:string"/>
+    <xs:element name="EntityId2" type="xs:string"/>
+    <xs:element name="EntityId3" type="xs:string"/>
+    <xs:element name="EntityId4" type="xs:string"/>
+    <xs:element name="EntityId5" type="xs:string"/>
+    <xs:element name="Terms">
+      <xs:complexType>
+        <xs:sequence>
+          <xs:element ref="pc:TermInfo" minOccurs="0" maxOccurs="unbounded"/>
+        </xs:sequence>
+      </xs:complexType>
+    </xs:element>
+    <xs:element name="TermInfo">
+      <xs:complexType>
+        <xs:sequence>
+          <xs:element ref="pc:TermName" minOccurs="0"/>
+          <xs:element ref="pc:TermId" minOccurs="0"/>
+        </xs:sequence>
+      </xs:complexType>
+    </xs:element>
+    <xs:element name="TermName" type="xs:string"/>
+    <xs:element name="TermId" type="xs:string"/>
+  </xs:schema>
+</ct:contentTypeSchema>
+</file>
+
+<file path=customXml/itemProps1.xml><?xml version="1.0" encoding="utf-8"?>
+<ds:datastoreItem xmlns:ds="http://schemas.openxmlformats.org/officeDocument/2006/customXml" ds:itemID="{F957A063-7FCB-4519-B9A9-D1134EF19C34}">
+  <ds:schemaRefs>
+    <ds:schemaRef ds:uri="http://schemas.microsoft.com/sharepoint/v3/contenttype/forms"/>
+  </ds:schemaRefs>
+</ds:datastoreItem>
+</file>
+
+<file path=customXml/itemProps2.xml><?xml version="1.0" encoding="utf-8"?>
+<ds:datastoreItem xmlns:ds="http://schemas.openxmlformats.org/officeDocument/2006/customXml" ds:itemID="{4FC81294-C080-4FBF-B689-9B379BD39E9A}">
+  <ds:schemaRefs>
+    <ds:schemaRef ds:uri="http://schemas.microsoft.com/office/2006/metadata/contentType"/>
+    <ds:schemaRef ds:uri="http://schemas.microsoft.com/office/2006/metadata/properties/metaAttributes"/>
+    <ds:schemaRef ds:uri="http://www.w3.org/2001/XMLSchema"/>
+    <ds:schemaRef ds:uri="http://schemas.microsoft.com/office/2006/metadata/properties"/>
+    <ds:schemaRef ds:uri="11dab2fc-a00f-488b-a519-3911044eea4e"/>
+    <ds:schemaRef ds:uri="202a9836-ee93-41fb-ba3c-167105785a0d"/>
+    <ds:schemaRef ds:uri="http://schemas.microsoft.com/office/2006/documentManagement/types"/>
+    <ds:schemaRef ds:uri="http://schemas.microsoft.com/office/infopath/2007/PartnerControls"/>
+    <ds:schemaRef ds:uri="http://schemas.openxmlformats.org/package/2006/metadata/core-properties"/>
+    <ds:schemaRef ds:uri="http://purl.org/dc/elements/1.1/"/>
+    <ds:schemaRef ds:uri="http://purl.org/dc/terms/"/>
+    <ds:schemaRef ds:uri="http://schemas.microsoft.com/internal/obd"/>
+  </ds:schemaRefs>
+</ds:datastoreItem>
 </file>
</xml_diff>